<commit_message>
updated final presentation with individual contribution
</commit_message>
<xml_diff>
--- a/Cloud_Final_Presentation.pptx
+++ b/Cloud_Final_Presentation.pptx
@@ -5,30 +5,31 @@
     <p:sldMasterId id="2147483654" r:id="rId1"/>
   </p:sldMasterIdLst>
   <p:notesMasterIdLst>
-    <p:notesMasterId r:id="rId23"/>
+    <p:notesMasterId r:id="rId24"/>
   </p:notesMasterIdLst>
   <p:sldIdLst>
     <p:sldId id="256" r:id="rId2"/>
     <p:sldId id="257" r:id="rId3"/>
     <p:sldId id="258" r:id="rId4"/>
-    <p:sldId id="259" r:id="rId5"/>
-    <p:sldId id="260" r:id="rId6"/>
-    <p:sldId id="261" r:id="rId7"/>
-    <p:sldId id="275" r:id="rId8"/>
-    <p:sldId id="263" r:id="rId9"/>
-    <p:sldId id="264" r:id="rId10"/>
-    <p:sldId id="265" r:id="rId11"/>
-    <p:sldId id="266" r:id="rId12"/>
-    <p:sldId id="267" r:id="rId13"/>
-    <p:sldId id="268" r:id="rId14"/>
-    <p:sldId id="269" r:id="rId15"/>
-    <p:sldId id="276" r:id="rId16"/>
-    <p:sldId id="277" r:id="rId17"/>
-    <p:sldId id="270" r:id="rId18"/>
-    <p:sldId id="278" r:id="rId19"/>
-    <p:sldId id="271" r:id="rId20"/>
-    <p:sldId id="272" r:id="rId21"/>
-    <p:sldId id="273" r:id="rId22"/>
+    <p:sldId id="279" r:id="rId5"/>
+    <p:sldId id="259" r:id="rId6"/>
+    <p:sldId id="260" r:id="rId7"/>
+    <p:sldId id="261" r:id="rId8"/>
+    <p:sldId id="275" r:id="rId9"/>
+    <p:sldId id="263" r:id="rId10"/>
+    <p:sldId id="264" r:id="rId11"/>
+    <p:sldId id="265" r:id="rId12"/>
+    <p:sldId id="266" r:id="rId13"/>
+    <p:sldId id="267" r:id="rId14"/>
+    <p:sldId id="268" r:id="rId15"/>
+    <p:sldId id="269" r:id="rId16"/>
+    <p:sldId id="276" r:id="rId17"/>
+    <p:sldId id="277" r:id="rId18"/>
+    <p:sldId id="270" r:id="rId19"/>
+    <p:sldId id="278" r:id="rId20"/>
+    <p:sldId id="271" r:id="rId21"/>
+    <p:sldId id="272" r:id="rId22"/>
+    <p:sldId id="273" r:id="rId23"/>
   </p:sldIdLst>
   <p:sldSz cx="9144000" cy="5143500" type="screen16x9"/>
   <p:notesSz cx="6858000" cy="9144000"/>
@@ -3368,6 +3369,200 @@
 </p:sldLayout>
 </file>
 
+<file path=ppt/slideLayouts/slideLayout7.xml><?xml version="1.0" encoding="utf-8"?>
+<p:sldLayout xmlns:a="http://schemas.openxmlformats.org/drawingml/2006/main" xmlns:r="http://schemas.openxmlformats.org/officeDocument/2006/relationships" xmlns:p="http://schemas.openxmlformats.org/presentationml/2006/main" type="obj">
+  <p:cSld name="Title and Content">
+    <p:spTree>
+      <p:nvGrpSpPr>
+        <p:cNvPr id="1" name=""/>
+        <p:cNvGrpSpPr/>
+        <p:nvPr/>
+      </p:nvGrpSpPr>
+      <p:grpSpPr>
+        <a:xfrm>
+          <a:off x="0" y="0"/>
+          <a:ext cx="0" cy="0"/>
+          <a:chOff x="0" y="0"/>
+          <a:chExt cx="0" cy="0"/>
+        </a:xfrm>
+      </p:grpSpPr>
+      <p:sp>
+        <p:nvSpPr>
+          <p:cNvPr id="2" name="Title 1"/>
+          <p:cNvSpPr>
+            <a:spLocks noGrp="1"/>
+          </p:cNvSpPr>
+          <p:nvPr>
+            <p:ph type="title"/>
+          </p:nvPr>
+        </p:nvSpPr>
+        <p:spPr/>
+        <p:txBody>
+          <a:bodyPr/>
+          <a:lstStyle/>
+          <a:p>
+            <a:r>
+              <a:rPr lang="en-US" smtClean="0"/>
+              <a:t>Click to edit Master title style</a:t>
+            </a:r>
+            <a:endParaRPr lang="en-US"/>
+          </a:p>
+        </p:txBody>
+      </p:sp>
+      <p:sp>
+        <p:nvSpPr>
+          <p:cNvPr id="3" name="Content Placeholder 2"/>
+          <p:cNvSpPr>
+            <a:spLocks noGrp="1"/>
+          </p:cNvSpPr>
+          <p:nvPr>
+            <p:ph idx="1"/>
+          </p:nvPr>
+        </p:nvSpPr>
+        <p:spPr/>
+        <p:txBody>
+          <a:bodyPr/>
+          <a:lstStyle/>
+          <a:p>
+            <a:pPr lvl="0"/>
+            <a:r>
+              <a:rPr lang="en-US" smtClean="0"/>
+              <a:t>Click to edit Master text styles</a:t>
+            </a:r>
+          </a:p>
+          <a:p>
+            <a:pPr lvl="1"/>
+            <a:r>
+              <a:rPr lang="en-US" smtClean="0"/>
+              <a:t>Second level</a:t>
+            </a:r>
+          </a:p>
+          <a:p>
+            <a:pPr lvl="2"/>
+            <a:r>
+              <a:rPr lang="en-US" smtClean="0"/>
+              <a:t>Third level</a:t>
+            </a:r>
+          </a:p>
+          <a:p>
+            <a:pPr lvl="3"/>
+            <a:r>
+              <a:rPr lang="en-US" smtClean="0"/>
+              <a:t>Fourth level</a:t>
+            </a:r>
+          </a:p>
+          <a:p>
+            <a:pPr lvl="4"/>
+            <a:r>
+              <a:rPr lang="en-US" smtClean="0"/>
+              <a:t>Fifth level</a:t>
+            </a:r>
+            <a:endParaRPr lang="en-US"/>
+          </a:p>
+        </p:txBody>
+      </p:sp>
+      <p:sp>
+        <p:nvSpPr>
+          <p:cNvPr id="4" name="Date Placeholder 3"/>
+          <p:cNvSpPr>
+            <a:spLocks noGrp="1"/>
+          </p:cNvSpPr>
+          <p:nvPr>
+            <p:ph type="dt" sz="half" idx="10"/>
+          </p:nvPr>
+        </p:nvSpPr>
+        <p:spPr>
+          <a:xfrm>
+            <a:off x="457200" y="4767263"/>
+            <a:ext cx="2133600" cy="273844"/>
+          </a:xfrm>
+          <a:prstGeom prst="rect">
+            <a:avLst/>
+          </a:prstGeom>
+        </p:spPr>
+        <p:txBody>
+          <a:bodyPr/>
+          <a:lstStyle/>
+          <a:p>
+            <a:fld id="{34964731-295E-4B4C-9354-B2630249258D}" type="datetimeFigureOut">
+              <a:rPr lang="en-US" smtClean="0"/>
+              <a:t>10/31/14</a:t>
+            </a:fld>
+            <a:endParaRPr lang="en-US"/>
+          </a:p>
+        </p:txBody>
+      </p:sp>
+      <p:sp>
+        <p:nvSpPr>
+          <p:cNvPr id="5" name="Footer Placeholder 4"/>
+          <p:cNvSpPr>
+            <a:spLocks noGrp="1"/>
+          </p:cNvSpPr>
+          <p:nvPr>
+            <p:ph type="ftr" sz="quarter" idx="11"/>
+          </p:nvPr>
+        </p:nvSpPr>
+        <p:spPr>
+          <a:xfrm>
+            <a:off x="3124200" y="4767263"/>
+            <a:ext cx="2895600" cy="273844"/>
+          </a:xfrm>
+          <a:prstGeom prst="rect">
+            <a:avLst/>
+          </a:prstGeom>
+        </p:spPr>
+        <p:txBody>
+          <a:bodyPr/>
+          <a:lstStyle/>
+          <a:p>
+            <a:endParaRPr lang="en-US"/>
+          </a:p>
+        </p:txBody>
+      </p:sp>
+      <p:sp>
+        <p:nvSpPr>
+          <p:cNvPr id="6" name="Slide Number Placeholder 5"/>
+          <p:cNvSpPr>
+            <a:spLocks noGrp="1"/>
+          </p:cNvSpPr>
+          <p:nvPr>
+            <p:ph type="sldNum" sz="quarter" idx="12"/>
+          </p:nvPr>
+        </p:nvSpPr>
+        <p:spPr>
+          <a:xfrm>
+            <a:off x="6553200" y="4767263"/>
+            <a:ext cx="2133600" cy="273844"/>
+          </a:xfrm>
+          <a:prstGeom prst="rect">
+            <a:avLst/>
+          </a:prstGeom>
+        </p:spPr>
+        <p:txBody>
+          <a:bodyPr/>
+          <a:lstStyle/>
+          <a:p>
+            <a:fld id="{830FD415-1B74-4DA2-BA41-754FF85AEE17}" type="slidenum">
+              <a:rPr lang="en-US" smtClean="0"/>
+              <a:t>‹#›</a:t>
+            </a:fld>
+            <a:endParaRPr lang="en-US"/>
+          </a:p>
+        </p:txBody>
+      </p:sp>
+    </p:spTree>
+    <p:extLst>
+      <p:ext uri="{BB962C8B-B14F-4D97-AF65-F5344CB8AC3E}">
+        <p14:creationId xmlns:p14="http://schemas.microsoft.com/office/powerpoint/2010/main" val="2376312299"/>
+      </p:ext>
+    </p:extLst>
+  </p:cSld>
+  <p:clrMapOvr>
+    <a:masterClrMapping/>
+  </p:clrMapOvr>
+</p:sldLayout>
+</file>
+
 <file path=ppt/slideMasters/slideMaster1.xml><?xml version="1.0" encoding="utf-8"?>
 <p:sldMaster xmlns:a="http://schemas.openxmlformats.org/drawingml/2006/main" xmlns:r="http://schemas.openxmlformats.org/officeDocument/2006/relationships" xmlns:p="http://schemas.openxmlformats.org/presentationml/2006/main">
   <p:cSld>
@@ -3575,6 +3770,7 @@
     <p:sldLayoutId id="2147483651" r:id="rId4"/>
     <p:sldLayoutId id="2147483652" r:id="rId5"/>
     <p:sldLayoutId id="2147483653" r:id="rId6"/>
+    <p:sldLayoutId id="2147483655" r:id="rId7"/>
   </p:sldLayoutIdLst>
   <p:txStyles>
     <p:titleStyle>
@@ -4270,13 +4466,13 @@
   <p:clrMapOvr>
     <a:masterClrMapping/>
   </p:clrMapOvr>
-  <p:transition spd="slow">
+  <p:transition xmlns:p14="http://schemas.microsoft.com/office/powerpoint/2010/main" spd="slow">
     <p:cut/>
   </p:transition>
   <p:timing>
     <p:tnLst>
       <p:par>
-        <p:cTn id="1" dur="indefinite" restart="never" nodeType="tmRoot"/>
+        <p:cTn xmlns:p14="http://schemas.microsoft.com/office/powerpoint/2010/main" id="1" dur="indefinite" restart="never" nodeType="tmRoot"/>
       </p:par>
     </p:tnLst>
   </p:timing>
@@ -4284,6 +4480,146 @@
 </file>
 
 <file path=ppt/slides/slide10.xml><?xml version="1.0" encoding="utf-8"?>
+<p:sld xmlns:a="http://schemas.openxmlformats.org/drawingml/2006/main" xmlns:r="http://schemas.openxmlformats.org/officeDocument/2006/relationships" xmlns:p="http://schemas.openxmlformats.org/presentationml/2006/main">
+  <p:cSld>
+    <p:spTree>
+      <p:nvGrpSpPr>
+        <p:cNvPr id="1" name="Shape 71"/>
+        <p:cNvGrpSpPr/>
+        <p:nvPr/>
+      </p:nvGrpSpPr>
+      <p:grpSpPr>
+        <a:xfrm>
+          <a:off x="0" y="0"/>
+          <a:ext cx="0" cy="0"/>
+          <a:chOff x="0" y="0"/>
+          <a:chExt cx="0" cy="0"/>
+        </a:xfrm>
+      </p:grpSpPr>
+      <p:sp>
+        <p:nvSpPr>
+          <p:cNvPr id="72" name="Shape 72"/>
+          <p:cNvSpPr txBox="1">
+            <a:spLocks noGrp="1"/>
+          </p:cNvSpPr>
+          <p:nvPr>
+            <p:ph type="title"/>
+          </p:nvPr>
+        </p:nvSpPr>
+        <p:spPr>
+          <a:xfrm>
+            <a:off x="457200" y="0"/>
+            <a:ext cx="8229600" cy="1063200"/>
+          </a:xfrm>
+          <a:prstGeom prst="rect">
+            <a:avLst/>
+          </a:prstGeom>
+        </p:spPr>
+        <p:txBody>
+          <a:bodyPr lIns="91425" tIns="91425" rIns="91425" bIns="91425" anchor="b" anchorCtr="0">
+            <a:noAutofit/>
+          </a:bodyPr>
+          <a:lstStyle/>
+          <a:p>
+            <a:pPr algn="ctr">
+              <a:spcBef>
+                <a:spcPts val="0"/>
+              </a:spcBef>
+              <a:buNone/>
+            </a:pPr>
+            <a:r>
+              <a:rPr lang="en-US" sz="2800">
+                <a:solidFill>
+                  <a:schemeClr val="dk1"/>
+                </a:solidFill>
+              </a:rPr>
+              <a:t>Login with facebook</a:t>
+            </a:r>
+          </a:p>
+        </p:txBody>
+      </p:sp>
+      <p:sp>
+        <p:nvSpPr>
+          <p:cNvPr id="73" name="Shape 73"/>
+          <p:cNvSpPr txBox="1">
+            <a:spLocks noGrp="1"/>
+          </p:cNvSpPr>
+          <p:nvPr>
+            <p:ph type="body" idx="1"/>
+          </p:nvPr>
+        </p:nvSpPr>
+        <p:spPr>
+          <a:xfrm>
+            <a:off x="513225" y="1244825"/>
+            <a:ext cx="8229600" cy="3943499"/>
+          </a:xfrm>
+          <a:prstGeom prst="rect">
+            <a:avLst/>
+          </a:prstGeom>
+        </p:spPr>
+        <p:txBody>
+          <a:bodyPr lIns="91425" tIns="91425" rIns="91425" bIns="91425" anchor="t" anchorCtr="0">
+            <a:noAutofit/>
+          </a:bodyPr>
+          <a:lstStyle/>
+          <a:p>
+            <a:pPr algn="ctr">
+              <a:spcBef>
+                <a:spcPts val="0"/>
+              </a:spcBef>
+              <a:buNone/>
+            </a:pPr>
+            <a:endParaRPr sz="2800"/>
+          </a:p>
+        </p:txBody>
+      </p:sp>
+      <p:pic>
+        <p:nvPicPr>
+          <p:cNvPr id="74" name="Shape 74"/>
+          <p:cNvPicPr preferRelativeResize="0"/>
+          <p:nvPr/>
+        </p:nvPicPr>
+        <p:blipFill>
+          <a:blip r:embed="rId3">
+            <a:alphaModFix/>
+          </a:blip>
+          <a:stretch>
+            <a:fillRect/>
+          </a:stretch>
+        </p:blipFill>
+        <p:spPr>
+          <a:xfrm>
+            <a:off x="959250" y="1354450"/>
+            <a:ext cx="7254650" cy="3724275"/>
+          </a:xfrm>
+          <a:prstGeom prst="rect">
+            <a:avLst/>
+          </a:prstGeom>
+          <a:noFill/>
+          <a:ln>
+            <a:noFill/>
+          </a:ln>
+        </p:spPr>
+      </p:pic>
+    </p:spTree>
+  </p:cSld>
+  <p:clrMapOvr>
+    <a:masterClrMapping/>
+  </p:clrMapOvr>
+  <p:transition xmlns:p14="http://schemas.microsoft.com/office/powerpoint/2010/main" spd="slow">
+    <p:cut/>
+  </p:transition>
+  <p:timing>
+    <p:tnLst>
+      <p:par>
+        <p:cTn xmlns:p14="http://schemas.microsoft.com/office/powerpoint/2010/main" id="1" dur="indefinite" restart="never" nodeType="tmRoot"/>
+      </p:par>
+    </p:tnLst>
+  </p:timing>
+</p:sld>
+</file>
+
+<file path=ppt/slides/slide11.xml><?xml version="1.0" encoding="utf-8"?>
 <p:sld xmlns:a="http://schemas.openxmlformats.org/drawingml/2006/main" xmlns:r="http://schemas.openxmlformats.org/officeDocument/2006/relationships" xmlns:p="http://schemas.openxmlformats.org/presentationml/2006/main">
   <p:cSld>
     <p:spTree>
@@ -4406,20 +4742,20 @@
   <p:clrMapOvr>
     <a:masterClrMapping/>
   </p:clrMapOvr>
-  <p:transition spd="slow">
+  <p:transition xmlns:p14="http://schemas.microsoft.com/office/powerpoint/2010/main" spd="slow">
     <p:cut/>
   </p:transition>
   <p:timing>
     <p:tnLst>
       <p:par>
-        <p:cTn id="1" dur="indefinite" restart="never" nodeType="tmRoot"/>
+        <p:cTn xmlns:p14="http://schemas.microsoft.com/office/powerpoint/2010/main" id="1" dur="indefinite" restart="never" nodeType="tmRoot"/>
       </p:par>
     </p:tnLst>
   </p:timing>
 </p:sld>
 </file>
 
-<file path=ppt/slides/slide11.xml><?xml version="1.0" encoding="utf-8"?>
+<file path=ppt/slides/slide12.xml><?xml version="1.0" encoding="utf-8"?>
 <p:sld xmlns:a="http://schemas.openxmlformats.org/drawingml/2006/main" xmlns:r="http://schemas.openxmlformats.org/officeDocument/2006/relationships" xmlns:p="http://schemas.openxmlformats.org/presentationml/2006/main">
   <p:cSld>
     <p:spTree>
@@ -4542,20 +4878,20 @@
   <p:clrMapOvr>
     <a:masterClrMapping/>
   </p:clrMapOvr>
-  <p:transition spd="slow">
+  <p:transition xmlns:p14="http://schemas.microsoft.com/office/powerpoint/2010/main" spd="slow">
     <p:cut/>
   </p:transition>
   <p:timing>
     <p:tnLst>
       <p:par>
-        <p:cTn id="1" dur="indefinite" restart="never" nodeType="tmRoot"/>
+        <p:cTn xmlns:p14="http://schemas.microsoft.com/office/powerpoint/2010/main" id="1" dur="indefinite" restart="never" nodeType="tmRoot"/>
       </p:par>
     </p:tnLst>
   </p:timing>
 </p:sld>
 </file>
 
-<file path=ppt/slides/slide12.xml><?xml version="1.0" encoding="utf-8"?>
+<file path=ppt/slides/slide13.xml><?xml version="1.0" encoding="utf-8"?>
 <p:sld xmlns:a="http://schemas.openxmlformats.org/drawingml/2006/main" xmlns:r="http://schemas.openxmlformats.org/officeDocument/2006/relationships" xmlns:p="http://schemas.openxmlformats.org/presentationml/2006/main">
   <p:cSld>
     <p:spTree>
@@ -4678,20 +5014,20 @@
   <p:clrMapOvr>
     <a:masterClrMapping/>
   </p:clrMapOvr>
-  <p:transition spd="slow">
+  <p:transition xmlns:p14="http://schemas.microsoft.com/office/powerpoint/2010/main" spd="slow">
     <p:cut/>
   </p:transition>
   <p:timing>
     <p:tnLst>
       <p:par>
-        <p:cTn id="1" dur="indefinite" restart="never" nodeType="tmRoot"/>
+        <p:cTn xmlns:p14="http://schemas.microsoft.com/office/powerpoint/2010/main" id="1" dur="indefinite" restart="never" nodeType="tmRoot"/>
       </p:par>
     </p:tnLst>
   </p:timing>
 </p:sld>
 </file>
 
-<file path=ppt/slides/slide13.xml><?xml version="1.0" encoding="utf-8"?>
+<file path=ppt/slides/slide14.xml><?xml version="1.0" encoding="utf-8"?>
 <p:sld xmlns:a="http://schemas.openxmlformats.org/drawingml/2006/main" xmlns:r="http://schemas.openxmlformats.org/officeDocument/2006/relationships" xmlns:p="http://schemas.openxmlformats.org/presentationml/2006/main">
   <p:cSld>
     <p:spTree>
@@ -4814,20 +5150,20 @@
   <p:clrMapOvr>
     <a:masterClrMapping/>
   </p:clrMapOvr>
-  <p:transition spd="slow">
+  <p:transition xmlns:p14="http://schemas.microsoft.com/office/powerpoint/2010/main" spd="slow">
     <p:cut/>
   </p:transition>
   <p:timing>
     <p:tnLst>
       <p:par>
-        <p:cTn id="1" dur="indefinite" restart="never" nodeType="tmRoot"/>
+        <p:cTn xmlns:p14="http://schemas.microsoft.com/office/powerpoint/2010/main" id="1" dur="indefinite" restart="never" nodeType="tmRoot"/>
       </p:par>
     </p:tnLst>
   </p:timing>
 </p:sld>
 </file>
 
-<file path=ppt/slides/slide14.xml><?xml version="1.0" encoding="utf-8"?>
+<file path=ppt/slides/slide15.xml><?xml version="1.0" encoding="utf-8"?>
 <p:sld xmlns:a="http://schemas.openxmlformats.org/drawingml/2006/main" xmlns:r="http://schemas.openxmlformats.org/officeDocument/2006/relationships" xmlns:p="http://schemas.openxmlformats.org/presentationml/2006/main">
   <p:cSld>
     <p:spTree>
@@ -4950,20 +5286,20 @@
   <p:clrMapOvr>
     <a:masterClrMapping/>
   </p:clrMapOvr>
-  <p:transition spd="slow">
+  <p:transition xmlns:p14="http://schemas.microsoft.com/office/powerpoint/2010/main" spd="slow">
     <p:cut/>
   </p:transition>
   <p:timing>
     <p:tnLst>
       <p:par>
-        <p:cTn id="1" dur="indefinite" restart="never" nodeType="tmRoot"/>
+        <p:cTn xmlns:p14="http://schemas.microsoft.com/office/powerpoint/2010/main" id="1" dur="indefinite" restart="never" nodeType="tmRoot"/>
       </p:par>
     </p:tnLst>
   </p:timing>
 </p:sld>
 </file>
 
-<file path=ppt/slides/slide15.xml><?xml version="1.0" encoding="utf-8"?>
+<file path=ppt/slides/slide16.xml><?xml version="1.0" encoding="utf-8"?>
 <p:sld xmlns:a="http://schemas.openxmlformats.org/drawingml/2006/main" xmlns:r="http://schemas.openxmlformats.org/officeDocument/2006/relationships" xmlns:p="http://schemas.openxmlformats.org/presentationml/2006/main">
   <p:cSld>
     <p:spTree>
@@ -5111,14 +5447,14 @@
   <p:timing>
     <p:tnLst>
       <p:par>
-        <p:cTn id="1" dur="indefinite" restart="never" nodeType="tmRoot"/>
+        <p:cTn xmlns:p14="http://schemas.microsoft.com/office/powerpoint/2010/main" id="1" dur="indefinite" restart="never" nodeType="tmRoot"/>
       </p:par>
     </p:tnLst>
   </p:timing>
 </p:sld>
 </file>
 
-<file path=ppt/slides/slide16.xml><?xml version="1.0" encoding="utf-8"?>
+<file path=ppt/slides/slide17.xml><?xml version="1.0" encoding="utf-8"?>
 <p:sld xmlns:a="http://schemas.openxmlformats.org/drawingml/2006/main" xmlns:r="http://schemas.openxmlformats.org/officeDocument/2006/relationships" xmlns:p="http://schemas.openxmlformats.org/presentationml/2006/main">
   <p:cSld>
     <p:spTree>
@@ -5247,20 +5583,20 @@
   <p:clrMapOvr>
     <a:masterClrMapping/>
   </p:clrMapOvr>
-  <p:transition spd="slow">
+  <p:transition xmlns:p14="http://schemas.microsoft.com/office/powerpoint/2010/main" spd="slow">
     <p:cut/>
   </p:transition>
   <p:timing>
     <p:tnLst>
       <p:par>
-        <p:cTn id="1" dur="indefinite" restart="never" nodeType="tmRoot"/>
+        <p:cTn xmlns:p14="http://schemas.microsoft.com/office/powerpoint/2010/main" id="1" dur="indefinite" restart="never" nodeType="tmRoot"/>
       </p:par>
     </p:tnLst>
   </p:timing>
 </p:sld>
 </file>
 
-<file path=ppt/slides/slide17.xml><?xml version="1.0" encoding="utf-8"?>
+<file path=ppt/slides/slide18.xml><?xml version="1.0" encoding="utf-8"?>
 <p:sld xmlns:a="http://schemas.openxmlformats.org/drawingml/2006/main" xmlns:r="http://schemas.openxmlformats.org/officeDocument/2006/relationships" xmlns:p="http://schemas.openxmlformats.org/presentationml/2006/main">
   <p:cSld>
     <p:spTree>
@@ -5695,20 +6031,20 @@
   <p:clrMapOvr>
     <a:masterClrMapping/>
   </p:clrMapOvr>
-  <p:transition spd="slow">
+  <p:transition xmlns:p14="http://schemas.microsoft.com/office/powerpoint/2010/main" spd="slow">
     <p:cut/>
   </p:transition>
   <p:timing>
     <p:tnLst>
       <p:par>
-        <p:cTn id="1" dur="indefinite" restart="never" nodeType="tmRoot"/>
+        <p:cTn xmlns:p14="http://schemas.microsoft.com/office/powerpoint/2010/main" id="1" dur="indefinite" restart="never" nodeType="tmRoot"/>
       </p:par>
     </p:tnLst>
   </p:timing>
 </p:sld>
 </file>
 
-<file path=ppt/slides/slide18.xml><?xml version="1.0" encoding="utf-8"?>
+<file path=ppt/slides/slide19.xml><?xml version="1.0" encoding="utf-8"?>
 <p:sld xmlns:a="http://schemas.openxmlformats.org/drawingml/2006/main" xmlns:r="http://schemas.openxmlformats.org/officeDocument/2006/relationships" xmlns:p="http://schemas.openxmlformats.org/presentationml/2006/main">
   <p:cSld>
     <p:spTree>
@@ -7205,371 +7541,7 @@
   <p:timing>
     <p:tnLst>
       <p:par>
-        <p:cTn id="1" dur="indefinite" restart="never" nodeType="tmRoot"/>
-      </p:par>
-    </p:tnLst>
-  </p:timing>
-</p:sld>
-</file>
-
-<file path=ppt/slides/slide19.xml><?xml version="1.0" encoding="utf-8"?>
-<p:sld xmlns:a="http://schemas.openxmlformats.org/drawingml/2006/main" xmlns:r="http://schemas.openxmlformats.org/officeDocument/2006/relationships" xmlns:p="http://schemas.openxmlformats.org/presentationml/2006/main">
-  <p:cSld>
-    <p:spTree>
-      <p:nvGrpSpPr>
-        <p:cNvPr id="1" name="Shape 119"/>
-        <p:cNvGrpSpPr/>
-        <p:nvPr/>
-      </p:nvGrpSpPr>
-      <p:grpSpPr>
-        <a:xfrm>
-          <a:off x="0" y="0"/>
-          <a:ext cx="0" cy="0"/>
-          <a:chOff x="0" y="0"/>
-          <a:chExt cx="0" cy="0"/>
-        </a:xfrm>
-      </p:grpSpPr>
-      <p:sp>
-        <p:nvSpPr>
-          <p:cNvPr id="120" name="Shape 120"/>
-          <p:cNvSpPr txBox="1">
-            <a:spLocks noGrp="1"/>
-          </p:cNvSpPr>
-          <p:nvPr>
-            <p:ph type="title"/>
-          </p:nvPr>
-        </p:nvSpPr>
-        <p:spPr>
-          <a:xfrm>
-            <a:off x="457200" y="205978"/>
-            <a:ext cx="8229600" cy="857400"/>
-          </a:xfrm>
-          <a:prstGeom prst="rect">
-            <a:avLst/>
-          </a:prstGeom>
-          <a:noFill/>
-          <a:ln>
-            <a:noFill/>
-          </a:ln>
-        </p:spPr>
-        <p:txBody>
-          <a:bodyPr lIns="0" tIns="0" rIns="0" bIns="0" anchor="b" anchorCtr="0">
-            <a:noAutofit/>
-          </a:bodyPr>
-          <a:lstStyle/>
-          <a:p>
-            <a:pPr marL="0" marR="0" lvl="0" indent="0" algn="ctr" rtl="0">
-              <a:spcBef>
-                <a:spcPts val="0"/>
-              </a:spcBef>
-              <a:buSzPct val="25000"/>
-              <a:buNone/>
-            </a:pPr>
-            <a:r>
-              <a:rPr lang="en-US" sz="3000" b="0" i="0" u="none" strike="noStrike" cap="none" baseline="0" dirty="0">
-                <a:latin typeface="Arial"/>
-                <a:ea typeface="Arial"/>
-                <a:cs typeface="Arial"/>
-                <a:sym typeface="Arial"/>
-              </a:rPr>
-              <a:t>Risks Involved</a:t>
-            </a:r>
-          </a:p>
-        </p:txBody>
-      </p:sp>
-      <p:sp>
-        <p:nvSpPr>
-          <p:cNvPr id="121" name="Shape 121"/>
-          <p:cNvSpPr txBox="1">
-            <a:spLocks noGrp="1"/>
-          </p:cNvSpPr>
-          <p:nvPr>
-            <p:ph type="body" idx="1"/>
-          </p:nvPr>
-        </p:nvSpPr>
-        <p:spPr>
-          <a:xfrm>
-            <a:off x="457200" y="1200150"/>
-            <a:ext cx="8229600" cy="3725698"/>
-          </a:xfrm>
-          <a:prstGeom prst="rect">
-            <a:avLst/>
-          </a:prstGeom>
-          <a:noFill/>
-          <a:ln>
-            <a:noFill/>
-          </a:ln>
-        </p:spPr>
-        <p:txBody>
-          <a:bodyPr lIns="0" tIns="0" rIns="0" bIns="0" anchor="t" anchorCtr="0">
-            <a:noAutofit/>
-          </a:bodyPr>
-          <a:lstStyle/>
-          <a:p>
-            <a:pPr marL="457200" marR="0" lvl="0" indent="-317500" algn="l" rtl="0">
-              <a:lnSpc>
-                <a:spcPct val="115000"/>
-              </a:lnSpc>
-              <a:spcBef>
-                <a:spcPts val="0"/>
-              </a:spcBef>
-              <a:buClr>
-                <a:srgbClr val="000000"/>
-              </a:buClr>
-              <a:buSzPct val="100000"/>
-              <a:buFont typeface="Arial"/>
-              <a:buChar char="●"/>
-            </a:pPr>
-            <a:r>
-              <a:rPr lang="en-US" sz="1400" b="0" i="0" u="none" strike="noStrike" cap="none" baseline="0">
-                <a:latin typeface="Arial"/>
-                <a:ea typeface="Arial"/>
-                <a:cs typeface="Arial"/>
-                <a:sym typeface="Arial"/>
-              </a:rPr>
-              <a:t>Nodes which are behind a NAT server will find it difficult to establish the connection. To avoid this, we would configure TURN server. If lot of traffic starts going to the TURN server then that might crash (Load Balancing is out of scope of the project). It would be a third party server that we would be using, so not having much control over that. </a:t>
-            </a:r>
-          </a:p>
-          <a:p>
-            <a:pPr marL="457200" marR="0" lvl="0" indent="-317500" algn="l" rtl="0">
-              <a:lnSpc>
-                <a:spcPct val="115000"/>
-              </a:lnSpc>
-              <a:spcBef>
-                <a:spcPts val="0"/>
-              </a:spcBef>
-              <a:buClr>
-                <a:srgbClr val="000000"/>
-              </a:buClr>
-              <a:buSzPct val="100000"/>
-              <a:buFont typeface="Arial"/>
-              <a:buChar char="●"/>
-            </a:pPr>
-            <a:r>
-              <a:rPr lang="en-US" sz="1400" b="0" i="0" u="none" strike="noStrike" cap="none" baseline="0">
-                <a:latin typeface="Arial"/>
-                <a:ea typeface="Arial"/>
-                <a:cs typeface="Arial"/>
-                <a:sym typeface="Arial"/>
-              </a:rPr>
-              <a:t>WebRTC doesn’t enforce a maximum limit on the number of connections which we can establish. So as a result we cannot accurately predict the number of connections before which the system might start to hang. It totally depends on the bandwidth of the users in that session.</a:t>
-            </a:r>
-          </a:p>
-          <a:p>
-            <a:pPr marL="457200" marR="0" lvl="0" indent="-317500" algn="l" rtl="0">
-              <a:lnSpc>
-                <a:spcPct val="115000"/>
-              </a:lnSpc>
-              <a:spcBef>
-                <a:spcPts val="0"/>
-              </a:spcBef>
-              <a:buClr>
-                <a:srgbClr val="000000"/>
-              </a:buClr>
-              <a:buSzPct val="100000"/>
-              <a:buFont typeface="Arial"/>
-              <a:buChar char="●"/>
-            </a:pPr>
-            <a:r>
-              <a:rPr lang="en-US" sz="1400" b="0" i="0" u="none" strike="noStrike" cap="none" baseline="0">
-                <a:latin typeface="Arial"/>
-                <a:ea typeface="Arial"/>
-                <a:cs typeface="Arial"/>
-                <a:sym typeface="Arial"/>
-              </a:rPr>
-              <a:t>WebRTC is a new technology and as it is with any new technology it is not that widely supported as of August 2014. It is supported on Chrome </a:t>
-            </a:r>
-            <a:r>
-              <a:rPr lang="en-US" sz="1400" b="0" i="0" u="none" strike="noStrike" cap="none" baseline="0">
-                <a:solidFill>
-                  <a:srgbClr val="252525"/>
-                </a:solidFill>
-                <a:latin typeface="Arial"/>
-                <a:ea typeface="Arial"/>
-                <a:cs typeface="Arial"/>
-                <a:sym typeface="Arial"/>
-              </a:rPr>
-              <a:t> 23</a:t>
-            </a:r>
-            <a:r>
-              <a:rPr lang="en-US" sz="1400" b="0" i="0" u="none" strike="noStrike" cap="none" baseline="0">
-                <a:latin typeface="Arial"/>
-                <a:ea typeface="Arial"/>
-                <a:cs typeface="Arial"/>
-                <a:sym typeface="Arial"/>
-              </a:rPr>
-              <a:t>, Firefox </a:t>
-            </a:r>
-            <a:r>
-              <a:rPr lang="en-US" sz="1400" b="0" i="0" u="none" strike="noStrike" cap="none" baseline="0">
-                <a:solidFill>
-                  <a:srgbClr val="252525"/>
-                </a:solidFill>
-                <a:latin typeface="Arial"/>
-                <a:ea typeface="Arial"/>
-                <a:cs typeface="Arial"/>
-                <a:sym typeface="Arial"/>
-              </a:rPr>
-              <a:t>22 </a:t>
-            </a:r>
-            <a:r>
-              <a:rPr lang="en-US" sz="1400" b="0" i="0" u="none" strike="noStrike" cap="none" baseline="0">
-                <a:latin typeface="Arial"/>
-                <a:ea typeface="Arial"/>
-                <a:cs typeface="Arial"/>
-                <a:sym typeface="Arial"/>
-              </a:rPr>
-              <a:t>and Opera </a:t>
-            </a:r>
-            <a:r>
-              <a:rPr lang="en-US" sz="1400" b="0" i="0" u="none" strike="noStrike" cap="none" baseline="0">
-                <a:solidFill>
-                  <a:srgbClr val="252525"/>
-                </a:solidFill>
-                <a:latin typeface="Arial"/>
-                <a:ea typeface="Arial"/>
-                <a:cs typeface="Arial"/>
-                <a:sym typeface="Arial"/>
-              </a:rPr>
-              <a:t>18 </a:t>
-            </a:r>
-            <a:r>
-              <a:rPr lang="en-US" sz="1400" b="0" i="0" u="none" strike="noStrike" cap="none" baseline="0">
-                <a:latin typeface="Arial"/>
-                <a:ea typeface="Arial"/>
-                <a:cs typeface="Arial"/>
-                <a:sym typeface="Arial"/>
-              </a:rPr>
-              <a:t>browsers for desktop but not Safari and IE. </a:t>
-            </a:r>
-          </a:p>
-          <a:p>
-            <a:pPr marL="457200" marR="0" lvl="0" indent="-317500" algn="l" rtl="0">
-              <a:lnSpc>
-                <a:spcPct val="115000"/>
-              </a:lnSpc>
-              <a:spcBef>
-                <a:spcPts val="0"/>
-              </a:spcBef>
-              <a:buClr>
-                <a:srgbClr val="000000"/>
-              </a:buClr>
-              <a:buSzPct val="100000"/>
-              <a:buFont typeface="Arial"/>
-              <a:buChar char="●"/>
-            </a:pPr>
-            <a:r>
-              <a:rPr lang="en-US" sz="1400" b="0" i="0" u="none" strike="noStrike" cap="none" baseline="0">
-                <a:latin typeface="Arial"/>
-                <a:ea typeface="Arial"/>
-                <a:cs typeface="Arial"/>
-                <a:sym typeface="Arial"/>
-              </a:rPr>
-              <a:t>As of August 2014, it is not yet fully supported across all mobile devices. The mobile browsers  Chrome </a:t>
-            </a:r>
-            <a:r>
-              <a:rPr lang="en-US" sz="1400" b="0" i="0" u="none" strike="noStrike" cap="none" baseline="0">
-                <a:solidFill>
-                  <a:srgbClr val="252525"/>
-                </a:solidFill>
-                <a:latin typeface="Arial"/>
-                <a:ea typeface="Arial"/>
-                <a:cs typeface="Arial"/>
-                <a:sym typeface="Arial"/>
-              </a:rPr>
-              <a:t>28</a:t>
-            </a:r>
-            <a:r>
-              <a:rPr lang="en-US" sz="1400" b="0" i="0" u="none" strike="noStrike" cap="none" baseline="0">
-                <a:latin typeface="Arial"/>
-                <a:ea typeface="Arial"/>
-                <a:cs typeface="Arial"/>
-                <a:sym typeface="Arial"/>
-              </a:rPr>
-              <a:t>, Firefox </a:t>
-            </a:r>
-            <a:r>
-              <a:rPr lang="en-US" sz="1400" b="0" i="0" u="none" strike="noStrike" cap="none" baseline="0">
-                <a:solidFill>
-                  <a:srgbClr val="252525"/>
-                </a:solidFill>
-                <a:latin typeface="Arial"/>
-                <a:ea typeface="Arial"/>
-                <a:cs typeface="Arial"/>
-                <a:sym typeface="Arial"/>
-              </a:rPr>
-              <a:t>24 </a:t>
-            </a:r>
-            <a:r>
-              <a:rPr lang="en-US" sz="1400" b="0" i="0" u="none" strike="noStrike" cap="none" baseline="0">
-                <a:latin typeface="Arial"/>
-                <a:ea typeface="Arial"/>
-                <a:cs typeface="Arial"/>
-                <a:sym typeface="Arial"/>
-              </a:rPr>
-              <a:t>and Opera Mobile </a:t>
-            </a:r>
-            <a:r>
-              <a:rPr lang="en-US" sz="1400" b="0" i="0" u="none" strike="noStrike" cap="none" baseline="0">
-                <a:solidFill>
-                  <a:srgbClr val="252525"/>
-                </a:solidFill>
-                <a:latin typeface="Arial"/>
-                <a:ea typeface="Arial"/>
-                <a:cs typeface="Arial"/>
-                <a:sym typeface="Arial"/>
-              </a:rPr>
-              <a:t>12 </a:t>
-            </a:r>
-            <a:r>
-              <a:rPr lang="en-US" sz="1400" b="0" i="0" u="none" strike="noStrike" cap="none" baseline="0">
-                <a:latin typeface="Arial"/>
-                <a:ea typeface="Arial"/>
-                <a:cs typeface="Arial"/>
-                <a:sym typeface="Arial"/>
-              </a:rPr>
-              <a:t>supports webRTC for all android. There isn’t much support for other mobile platforms. </a:t>
-            </a:r>
-          </a:p>
-          <a:p>
-            <a:pPr marL="457200" marR="0" lvl="0" indent="-317500" algn="l" rtl="0">
-              <a:lnSpc>
-                <a:spcPct val="115000"/>
-              </a:lnSpc>
-              <a:spcBef>
-                <a:spcPts val="0"/>
-              </a:spcBef>
-              <a:buClr>
-                <a:srgbClr val="000000"/>
-              </a:buClr>
-              <a:buSzPct val="100000"/>
-              <a:buFont typeface="Arial"/>
-              <a:buChar char="●"/>
-            </a:pPr>
-            <a:r>
-              <a:rPr lang="en-US" sz="1400" b="0" i="0" u="none" strike="noStrike" cap="none" baseline="0">
-                <a:latin typeface="Arial"/>
-                <a:ea typeface="Arial"/>
-                <a:cs typeface="Arial"/>
-                <a:sym typeface="Arial"/>
-              </a:rPr>
-              <a:t>As of August 2014, it is not yet a complete nor stable, and as such is not yet suitable for commercial implementation.[3] </a:t>
-            </a:r>
-          </a:p>
-        </p:txBody>
-      </p:sp>
-    </p:spTree>
-  </p:cSld>
-  <p:clrMapOvr>
-    <a:masterClrMapping/>
-  </p:clrMapOvr>
-  <p:transition spd="slow">
-    <p:cut/>
-  </p:transition>
-  <p:timing>
-    <p:tnLst>
-      <p:par>
-        <p:cTn id="1" dur="indefinite" restart="never" nodeType="tmRoot"/>
+        <p:cTn xmlns:p14="http://schemas.microsoft.com/office/powerpoint/2010/main" id="1" dur="indefinite" restart="never" nodeType="tmRoot"/>
       </p:par>
     </p:tnLst>
   </p:timing>
@@ -7926,13 +7898,13 @@
   <p:clrMapOvr>
     <a:masterClrMapping/>
   </p:clrMapOvr>
-  <p:transition spd="slow">
+  <p:transition xmlns:p14="http://schemas.microsoft.com/office/powerpoint/2010/main" spd="slow">
     <p:cut/>
   </p:transition>
   <p:timing>
     <p:tnLst>
       <p:par>
-        <p:cTn id="1" dur="indefinite" restart="never" nodeType="tmRoot"/>
+        <p:cTn xmlns:p14="http://schemas.microsoft.com/office/powerpoint/2010/main" id="1" dur="indefinite" restart="never" nodeType="tmRoot"/>
       </p:par>
     </p:tnLst>
   </p:timing>
@@ -7940,6 +7912,370 @@
 </file>
 
 <file path=ppt/slides/slide20.xml><?xml version="1.0" encoding="utf-8"?>
+<p:sld xmlns:a="http://schemas.openxmlformats.org/drawingml/2006/main" xmlns:r="http://schemas.openxmlformats.org/officeDocument/2006/relationships" xmlns:p="http://schemas.openxmlformats.org/presentationml/2006/main">
+  <p:cSld>
+    <p:spTree>
+      <p:nvGrpSpPr>
+        <p:cNvPr id="1" name="Shape 119"/>
+        <p:cNvGrpSpPr/>
+        <p:nvPr/>
+      </p:nvGrpSpPr>
+      <p:grpSpPr>
+        <a:xfrm>
+          <a:off x="0" y="0"/>
+          <a:ext cx="0" cy="0"/>
+          <a:chOff x="0" y="0"/>
+          <a:chExt cx="0" cy="0"/>
+        </a:xfrm>
+      </p:grpSpPr>
+      <p:sp>
+        <p:nvSpPr>
+          <p:cNvPr id="120" name="Shape 120"/>
+          <p:cNvSpPr txBox="1">
+            <a:spLocks noGrp="1"/>
+          </p:cNvSpPr>
+          <p:nvPr>
+            <p:ph type="title"/>
+          </p:nvPr>
+        </p:nvSpPr>
+        <p:spPr>
+          <a:xfrm>
+            <a:off x="457200" y="205978"/>
+            <a:ext cx="8229600" cy="857400"/>
+          </a:xfrm>
+          <a:prstGeom prst="rect">
+            <a:avLst/>
+          </a:prstGeom>
+          <a:noFill/>
+          <a:ln>
+            <a:noFill/>
+          </a:ln>
+        </p:spPr>
+        <p:txBody>
+          <a:bodyPr lIns="0" tIns="0" rIns="0" bIns="0" anchor="b" anchorCtr="0">
+            <a:noAutofit/>
+          </a:bodyPr>
+          <a:lstStyle/>
+          <a:p>
+            <a:pPr marL="0" marR="0" lvl="0" indent="0" algn="ctr" rtl="0">
+              <a:spcBef>
+                <a:spcPts val="0"/>
+              </a:spcBef>
+              <a:buSzPct val="25000"/>
+              <a:buNone/>
+            </a:pPr>
+            <a:r>
+              <a:rPr lang="en-US" sz="3000" b="0" i="0" u="none" strike="noStrike" cap="none" baseline="0" dirty="0">
+                <a:latin typeface="Arial"/>
+                <a:ea typeface="Arial"/>
+                <a:cs typeface="Arial"/>
+                <a:sym typeface="Arial"/>
+              </a:rPr>
+              <a:t>Risks Involved</a:t>
+            </a:r>
+          </a:p>
+        </p:txBody>
+      </p:sp>
+      <p:sp>
+        <p:nvSpPr>
+          <p:cNvPr id="121" name="Shape 121"/>
+          <p:cNvSpPr txBox="1">
+            <a:spLocks noGrp="1"/>
+          </p:cNvSpPr>
+          <p:nvPr>
+            <p:ph type="body" idx="1"/>
+          </p:nvPr>
+        </p:nvSpPr>
+        <p:spPr>
+          <a:xfrm>
+            <a:off x="457200" y="1200150"/>
+            <a:ext cx="8229600" cy="3725698"/>
+          </a:xfrm>
+          <a:prstGeom prst="rect">
+            <a:avLst/>
+          </a:prstGeom>
+          <a:noFill/>
+          <a:ln>
+            <a:noFill/>
+          </a:ln>
+        </p:spPr>
+        <p:txBody>
+          <a:bodyPr lIns="0" tIns="0" rIns="0" bIns="0" anchor="t" anchorCtr="0">
+            <a:noAutofit/>
+          </a:bodyPr>
+          <a:lstStyle/>
+          <a:p>
+            <a:pPr marL="457200" marR="0" lvl="0" indent="-317500" algn="l" rtl="0">
+              <a:lnSpc>
+                <a:spcPct val="115000"/>
+              </a:lnSpc>
+              <a:spcBef>
+                <a:spcPts val="0"/>
+              </a:spcBef>
+              <a:buClr>
+                <a:srgbClr val="000000"/>
+              </a:buClr>
+              <a:buSzPct val="100000"/>
+              <a:buFont typeface="Arial"/>
+              <a:buChar char="●"/>
+            </a:pPr>
+            <a:r>
+              <a:rPr lang="en-US" sz="1400" b="0" i="0" u="none" strike="noStrike" cap="none" baseline="0">
+                <a:latin typeface="Arial"/>
+                <a:ea typeface="Arial"/>
+                <a:cs typeface="Arial"/>
+                <a:sym typeface="Arial"/>
+              </a:rPr>
+              <a:t>Nodes which are behind a NAT server will find it difficult to establish the connection. To avoid this, we would configure TURN server. If lot of traffic starts going to the TURN server then that might crash (Load Balancing is out of scope of the project). It would be a third party server that we would be using, so not having much control over that. </a:t>
+            </a:r>
+          </a:p>
+          <a:p>
+            <a:pPr marL="457200" marR="0" lvl="0" indent="-317500" algn="l" rtl="0">
+              <a:lnSpc>
+                <a:spcPct val="115000"/>
+              </a:lnSpc>
+              <a:spcBef>
+                <a:spcPts val="0"/>
+              </a:spcBef>
+              <a:buClr>
+                <a:srgbClr val="000000"/>
+              </a:buClr>
+              <a:buSzPct val="100000"/>
+              <a:buFont typeface="Arial"/>
+              <a:buChar char="●"/>
+            </a:pPr>
+            <a:r>
+              <a:rPr lang="en-US" sz="1400" b="0" i="0" u="none" strike="noStrike" cap="none" baseline="0">
+                <a:latin typeface="Arial"/>
+                <a:ea typeface="Arial"/>
+                <a:cs typeface="Arial"/>
+                <a:sym typeface="Arial"/>
+              </a:rPr>
+              <a:t>WebRTC doesn’t enforce a maximum limit on the number of connections which we can establish. So as a result we cannot accurately predict the number of connections before which the system might start to hang. It totally depends on the bandwidth of the users in that session.</a:t>
+            </a:r>
+          </a:p>
+          <a:p>
+            <a:pPr marL="457200" marR="0" lvl="0" indent="-317500" algn="l" rtl="0">
+              <a:lnSpc>
+                <a:spcPct val="115000"/>
+              </a:lnSpc>
+              <a:spcBef>
+                <a:spcPts val="0"/>
+              </a:spcBef>
+              <a:buClr>
+                <a:srgbClr val="000000"/>
+              </a:buClr>
+              <a:buSzPct val="100000"/>
+              <a:buFont typeface="Arial"/>
+              <a:buChar char="●"/>
+            </a:pPr>
+            <a:r>
+              <a:rPr lang="en-US" sz="1400" b="0" i="0" u="none" strike="noStrike" cap="none" baseline="0">
+                <a:latin typeface="Arial"/>
+                <a:ea typeface="Arial"/>
+                <a:cs typeface="Arial"/>
+                <a:sym typeface="Arial"/>
+              </a:rPr>
+              <a:t>WebRTC is a new technology and as it is with any new technology it is not that widely supported as of August 2014. It is supported on Chrome </a:t>
+            </a:r>
+            <a:r>
+              <a:rPr lang="en-US" sz="1400" b="0" i="0" u="none" strike="noStrike" cap="none" baseline="0">
+                <a:solidFill>
+                  <a:srgbClr val="252525"/>
+                </a:solidFill>
+                <a:latin typeface="Arial"/>
+                <a:ea typeface="Arial"/>
+                <a:cs typeface="Arial"/>
+                <a:sym typeface="Arial"/>
+              </a:rPr>
+              <a:t> 23</a:t>
+            </a:r>
+            <a:r>
+              <a:rPr lang="en-US" sz="1400" b="0" i="0" u="none" strike="noStrike" cap="none" baseline="0">
+                <a:latin typeface="Arial"/>
+                <a:ea typeface="Arial"/>
+                <a:cs typeface="Arial"/>
+                <a:sym typeface="Arial"/>
+              </a:rPr>
+              <a:t>, Firefox </a:t>
+            </a:r>
+            <a:r>
+              <a:rPr lang="en-US" sz="1400" b="0" i="0" u="none" strike="noStrike" cap="none" baseline="0">
+                <a:solidFill>
+                  <a:srgbClr val="252525"/>
+                </a:solidFill>
+                <a:latin typeface="Arial"/>
+                <a:ea typeface="Arial"/>
+                <a:cs typeface="Arial"/>
+                <a:sym typeface="Arial"/>
+              </a:rPr>
+              <a:t>22 </a:t>
+            </a:r>
+            <a:r>
+              <a:rPr lang="en-US" sz="1400" b="0" i="0" u="none" strike="noStrike" cap="none" baseline="0">
+                <a:latin typeface="Arial"/>
+                <a:ea typeface="Arial"/>
+                <a:cs typeface="Arial"/>
+                <a:sym typeface="Arial"/>
+              </a:rPr>
+              <a:t>and Opera </a:t>
+            </a:r>
+            <a:r>
+              <a:rPr lang="en-US" sz="1400" b="0" i="0" u="none" strike="noStrike" cap="none" baseline="0">
+                <a:solidFill>
+                  <a:srgbClr val="252525"/>
+                </a:solidFill>
+                <a:latin typeface="Arial"/>
+                <a:ea typeface="Arial"/>
+                <a:cs typeface="Arial"/>
+                <a:sym typeface="Arial"/>
+              </a:rPr>
+              <a:t>18 </a:t>
+            </a:r>
+            <a:r>
+              <a:rPr lang="en-US" sz="1400" b="0" i="0" u="none" strike="noStrike" cap="none" baseline="0">
+                <a:latin typeface="Arial"/>
+                <a:ea typeface="Arial"/>
+                <a:cs typeface="Arial"/>
+                <a:sym typeface="Arial"/>
+              </a:rPr>
+              <a:t>browsers for desktop but not Safari and IE. </a:t>
+            </a:r>
+          </a:p>
+          <a:p>
+            <a:pPr marL="457200" marR="0" lvl="0" indent="-317500" algn="l" rtl="0">
+              <a:lnSpc>
+                <a:spcPct val="115000"/>
+              </a:lnSpc>
+              <a:spcBef>
+                <a:spcPts val="0"/>
+              </a:spcBef>
+              <a:buClr>
+                <a:srgbClr val="000000"/>
+              </a:buClr>
+              <a:buSzPct val="100000"/>
+              <a:buFont typeface="Arial"/>
+              <a:buChar char="●"/>
+            </a:pPr>
+            <a:r>
+              <a:rPr lang="en-US" sz="1400" b="0" i="0" u="none" strike="noStrike" cap="none" baseline="0">
+                <a:latin typeface="Arial"/>
+                <a:ea typeface="Arial"/>
+                <a:cs typeface="Arial"/>
+                <a:sym typeface="Arial"/>
+              </a:rPr>
+              <a:t>As of August 2014, it is not yet fully supported across all mobile devices. The mobile browsers  Chrome </a:t>
+            </a:r>
+            <a:r>
+              <a:rPr lang="en-US" sz="1400" b="0" i="0" u="none" strike="noStrike" cap="none" baseline="0">
+                <a:solidFill>
+                  <a:srgbClr val="252525"/>
+                </a:solidFill>
+                <a:latin typeface="Arial"/>
+                <a:ea typeface="Arial"/>
+                <a:cs typeface="Arial"/>
+                <a:sym typeface="Arial"/>
+              </a:rPr>
+              <a:t>28</a:t>
+            </a:r>
+            <a:r>
+              <a:rPr lang="en-US" sz="1400" b="0" i="0" u="none" strike="noStrike" cap="none" baseline="0">
+                <a:latin typeface="Arial"/>
+                <a:ea typeface="Arial"/>
+                <a:cs typeface="Arial"/>
+                <a:sym typeface="Arial"/>
+              </a:rPr>
+              <a:t>, Firefox </a:t>
+            </a:r>
+            <a:r>
+              <a:rPr lang="en-US" sz="1400" b="0" i="0" u="none" strike="noStrike" cap="none" baseline="0">
+                <a:solidFill>
+                  <a:srgbClr val="252525"/>
+                </a:solidFill>
+                <a:latin typeface="Arial"/>
+                <a:ea typeface="Arial"/>
+                <a:cs typeface="Arial"/>
+                <a:sym typeface="Arial"/>
+              </a:rPr>
+              <a:t>24 </a:t>
+            </a:r>
+            <a:r>
+              <a:rPr lang="en-US" sz="1400" b="0" i="0" u="none" strike="noStrike" cap="none" baseline="0">
+                <a:latin typeface="Arial"/>
+                <a:ea typeface="Arial"/>
+                <a:cs typeface="Arial"/>
+                <a:sym typeface="Arial"/>
+              </a:rPr>
+              <a:t>and Opera Mobile </a:t>
+            </a:r>
+            <a:r>
+              <a:rPr lang="en-US" sz="1400" b="0" i="0" u="none" strike="noStrike" cap="none" baseline="0">
+                <a:solidFill>
+                  <a:srgbClr val="252525"/>
+                </a:solidFill>
+                <a:latin typeface="Arial"/>
+                <a:ea typeface="Arial"/>
+                <a:cs typeface="Arial"/>
+                <a:sym typeface="Arial"/>
+              </a:rPr>
+              <a:t>12 </a:t>
+            </a:r>
+            <a:r>
+              <a:rPr lang="en-US" sz="1400" b="0" i="0" u="none" strike="noStrike" cap="none" baseline="0">
+                <a:latin typeface="Arial"/>
+                <a:ea typeface="Arial"/>
+                <a:cs typeface="Arial"/>
+                <a:sym typeface="Arial"/>
+              </a:rPr>
+              <a:t>supports webRTC for all android. There isn’t much support for other mobile platforms. </a:t>
+            </a:r>
+          </a:p>
+          <a:p>
+            <a:pPr marL="457200" marR="0" lvl="0" indent="-317500" algn="l" rtl="0">
+              <a:lnSpc>
+                <a:spcPct val="115000"/>
+              </a:lnSpc>
+              <a:spcBef>
+                <a:spcPts val="0"/>
+              </a:spcBef>
+              <a:buClr>
+                <a:srgbClr val="000000"/>
+              </a:buClr>
+              <a:buSzPct val="100000"/>
+              <a:buFont typeface="Arial"/>
+              <a:buChar char="●"/>
+            </a:pPr>
+            <a:r>
+              <a:rPr lang="en-US" sz="1400" b="0" i="0" u="none" strike="noStrike" cap="none" baseline="0">
+                <a:latin typeface="Arial"/>
+                <a:ea typeface="Arial"/>
+                <a:cs typeface="Arial"/>
+                <a:sym typeface="Arial"/>
+              </a:rPr>
+              <a:t>As of August 2014, it is not yet a complete nor stable, and as such is not yet suitable for commercial implementation.[3] </a:t>
+            </a:r>
+          </a:p>
+        </p:txBody>
+      </p:sp>
+    </p:spTree>
+  </p:cSld>
+  <p:clrMapOvr>
+    <a:masterClrMapping/>
+  </p:clrMapOvr>
+  <p:transition xmlns:p14="http://schemas.microsoft.com/office/powerpoint/2010/main" spd="slow">
+    <p:cut/>
+  </p:transition>
+  <p:timing>
+    <p:tnLst>
+      <p:par>
+        <p:cTn xmlns:p14="http://schemas.microsoft.com/office/powerpoint/2010/main" id="1" dur="indefinite" restart="never" nodeType="tmRoot"/>
+      </p:par>
+    </p:tnLst>
+  </p:timing>
+</p:sld>
+</file>
+
+<file path=ppt/slides/slide21.xml><?xml version="1.0" encoding="utf-8"?>
 <p:sld xmlns:a="http://schemas.openxmlformats.org/drawingml/2006/main" xmlns:r="http://schemas.openxmlformats.org/officeDocument/2006/relationships" xmlns:p="http://schemas.openxmlformats.org/presentationml/2006/main">
   <p:cSld>
     <p:spTree>
@@ -8127,20 +8463,20 @@
   <p:clrMapOvr>
     <a:masterClrMapping/>
   </p:clrMapOvr>
-  <p:transition spd="slow">
+  <p:transition xmlns:p14="http://schemas.microsoft.com/office/powerpoint/2010/main" spd="slow">
     <p:cut/>
   </p:transition>
   <p:timing>
     <p:tnLst>
       <p:par>
-        <p:cTn id="1" dur="indefinite" restart="never" nodeType="tmRoot"/>
+        <p:cTn xmlns:p14="http://schemas.microsoft.com/office/powerpoint/2010/main" id="1" dur="indefinite" restart="never" nodeType="tmRoot"/>
       </p:par>
     </p:tnLst>
   </p:timing>
 </p:sld>
 </file>
 
-<file path=ppt/slides/slide21.xml><?xml version="1.0" encoding="utf-8"?>
+<file path=ppt/slides/slide22.xml><?xml version="1.0" encoding="utf-8"?>
 <p:sld xmlns:a="http://schemas.openxmlformats.org/drawingml/2006/main" xmlns:r="http://schemas.openxmlformats.org/officeDocument/2006/relationships" xmlns:p="http://schemas.openxmlformats.org/presentationml/2006/main">
   <p:cSld>
     <p:spTree>
@@ -8350,13 +8686,13 @@
   <p:clrMapOvr>
     <a:masterClrMapping/>
   </p:clrMapOvr>
-  <p:transition spd="slow">
+  <p:transition xmlns:p14="http://schemas.microsoft.com/office/powerpoint/2010/main" spd="slow">
     <p:cut/>
   </p:transition>
   <p:timing>
     <p:tnLst>
       <p:par>
-        <p:cTn id="1" dur="indefinite" restart="never" nodeType="tmRoot"/>
+        <p:cTn xmlns:p14="http://schemas.microsoft.com/office/powerpoint/2010/main" id="1" dur="indefinite" restart="never" nodeType="tmRoot"/>
       </p:par>
     </p:tnLst>
   </p:timing>
@@ -8603,13 +8939,13 @@
   <p:clrMapOvr>
     <a:masterClrMapping/>
   </p:clrMapOvr>
-  <p:transition spd="slow">
+  <p:transition xmlns:p14="http://schemas.microsoft.com/office/powerpoint/2010/main" spd="slow">
     <p:cut/>
   </p:transition>
   <p:timing>
     <p:tnLst>
       <p:par>
-        <p:cTn id="1" dur="indefinite" restart="never" nodeType="tmRoot"/>
+        <p:cTn xmlns:p14="http://schemas.microsoft.com/office/powerpoint/2010/main" id="1" dur="indefinite" restart="never" nodeType="tmRoot"/>
       </p:par>
     </p:tnLst>
   </p:timing>
@@ -8617,6 +8953,995 @@
 </file>
 
 <file path=ppt/slides/slide4.xml><?xml version="1.0" encoding="utf-8"?>
+<p:sld xmlns:a="http://schemas.openxmlformats.org/drawingml/2006/main" xmlns:r="http://schemas.openxmlformats.org/officeDocument/2006/relationships" xmlns:p="http://schemas.openxmlformats.org/presentationml/2006/main">
+  <p:cSld>
+    <p:spTree>
+      <p:nvGrpSpPr>
+        <p:cNvPr id="1" name=""/>
+        <p:cNvGrpSpPr/>
+        <p:nvPr/>
+      </p:nvGrpSpPr>
+      <p:grpSpPr>
+        <a:xfrm>
+          <a:off x="0" y="0"/>
+          <a:ext cx="0" cy="0"/>
+          <a:chOff x="0" y="0"/>
+          <a:chExt cx="0" cy="0"/>
+        </a:xfrm>
+      </p:grpSpPr>
+      <p:sp>
+        <p:nvSpPr>
+          <p:cNvPr id="2" name="Title 1"/>
+          <p:cNvSpPr>
+            <a:spLocks noGrp="1"/>
+          </p:cNvSpPr>
+          <p:nvPr>
+            <p:ph type="title"/>
+          </p:nvPr>
+        </p:nvSpPr>
+        <p:spPr/>
+        <p:txBody>
+          <a:bodyPr/>
+          <a:lstStyle/>
+          <a:p>
+            <a:r>
+              <a:rPr lang="en-US" dirty="0" smtClean="0"/>
+              <a:t>Individual Contribution</a:t>
+            </a:r>
+            <a:endParaRPr lang="en-US" dirty="0"/>
+          </a:p>
+        </p:txBody>
+      </p:sp>
+      <p:graphicFrame>
+        <p:nvGraphicFramePr>
+          <p:cNvPr id="4" name="Content Placeholder 3"/>
+          <p:cNvGraphicFramePr>
+            <a:graphicFrameLocks noGrp="1"/>
+          </p:cNvGraphicFramePr>
+          <p:nvPr>
+            <p:ph idx="1"/>
+            <p:extLst>
+              <p:ext uri="{D42A27DB-BD31-4B8C-83A1-F6EECF244321}">
+                <p14:modId xmlns:p14="http://schemas.microsoft.com/office/powerpoint/2010/main" val="1454318001"/>
+              </p:ext>
+            </p:extLst>
+          </p:nvPr>
+        </p:nvGraphicFramePr>
+        <p:xfrm>
+          <a:off x="533400" y="1143000"/>
+          <a:ext cx="8229600" cy="3543304"/>
+        </p:xfrm>
+        <a:graphic>
+          <a:graphicData uri="http://schemas.openxmlformats.org/drawingml/2006/table">
+            <a:tbl>
+              <a:tblPr>
+                <a:tableStyleId>{5C22544A-7EE6-4342-B048-85BDC9FD1C3A}</a:tableStyleId>
+              </a:tblPr>
+              <a:tblGrid>
+                <a:gridCol w="1795252"/>
+                <a:gridCol w="4928784"/>
+                <a:gridCol w="1505564"/>
+              </a:tblGrid>
+              <a:tr h="442913">
+                <a:tc>
+                  <a:txBody>
+                    <a:bodyPr/>
+                    <a:lstStyle/>
+                    <a:p>
+                      <a:pPr algn="ctr" fontAlgn="b"/>
+                      <a:r>
+                        <a:rPr lang="en-US" sz="800" u="none" strike="noStrike" dirty="0">
+                          <a:effectLst/>
+                        </a:rPr>
+                        <a:t>Team Members</a:t>
+                      </a:r>
+                      <a:endParaRPr lang="en-US" sz="800" b="0" i="0" u="none" strike="noStrike" dirty="0">
+                        <a:solidFill>
+                          <a:srgbClr val="000000"/>
+                        </a:solidFill>
+                        <a:effectLst/>
+                        <a:latin typeface="Calibri"/>
+                      </a:endParaRPr>
+                    </a:p>
+                  </a:txBody>
+                  <a:tcPr marL="9525" marR="9525" marT="7144" marB="0" anchor="b"/>
+                </a:tc>
+                <a:tc>
+                  <a:txBody>
+                    <a:bodyPr/>
+                    <a:lstStyle/>
+                    <a:p>
+                      <a:pPr algn="ctr" fontAlgn="b"/>
+                      <a:r>
+                        <a:rPr lang="en-US" sz="800" u="none" strike="noStrike">
+                          <a:effectLst/>
+                        </a:rPr>
+                        <a:t>Tasks</a:t>
+                      </a:r>
+                      <a:endParaRPr lang="en-US" sz="800" b="0" i="0" u="none" strike="noStrike">
+                        <a:solidFill>
+                          <a:srgbClr val="000000"/>
+                        </a:solidFill>
+                        <a:effectLst/>
+                        <a:latin typeface="Calibri"/>
+                      </a:endParaRPr>
+                    </a:p>
+                  </a:txBody>
+                  <a:tcPr marL="9525" marR="9525" marT="7144" marB="0" anchor="b"/>
+                </a:tc>
+                <a:tc>
+                  <a:txBody>
+                    <a:bodyPr/>
+                    <a:lstStyle/>
+                    <a:p>
+                      <a:pPr algn="ctr" fontAlgn="b"/>
+                      <a:r>
+                        <a:rPr lang="en-US" sz="800" u="none" strike="noStrike">
+                          <a:effectLst/>
+                        </a:rPr>
+                        <a:t>% Workload</a:t>
+                      </a:r>
+                      <a:endParaRPr lang="en-US" sz="800" b="0" i="0" u="none" strike="noStrike">
+                        <a:solidFill>
+                          <a:srgbClr val="000000"/>
+                        </a:solidFill>
+                        <a:effectLst/>
+                        <a:latin typeface="Calibri"/>
+                      </a:endParaRPr>
+                    </a:p>
+                  </a:txBody>
+                  <a:tcPr marL="9525" marR="9525" marT="7144" marB="0" anchor="b"/>
+                </a:tc>
+              </a:tr>
+              <a:tr h="442913">
+                <a:tc>
+                  <a:txBody>
+                    <a:bodyPr/>
+                    <a:lstStyle/>
+                    <a:p>
+                      <a:pPr algn="ctr" fontAlgn="b"/>
+                      <a:r>
+                        <a:rPr lang="en-US" sz="800" u="none" strike="noStrike">
+                          <a:effectLst/>
+                        </a:rPr>
+                        <a:t>Aman, Krishnan, Shiva</a:t>
+                      </a:r>
+                      <a:endParaRPr lang="en-US" sz="800" b="0" i="0" u="none" strike="noStrike">
+                        <a:solidFill>
+                          <a:srgbClr val="000000"/>
+                        </a:solidFill>
+                        <a:effectLst/>
+                        <a:latin typeface="Calibri"/>
+                      </a:endParaRPr>
+                    </a:p>
+                  </a:txBody>
+                  <a:tcPr marL="9525" marR="9525" marT="7144" marB="0" anchor="b"/>
+                </a:tc>
+                <a:tc>
+                  <a:txBody>
+                    <a:bodyPr/>
+                    <a:lstStyle/>
+                    <a:p>
+                      <a:pPr algn="l" fontAlgn="b"/>
+                      <a:r>
+                        <a:rPr lang="en-US" sz="800" u="none" strike="noStrike">
+                          <a:effectLst/>
+                        </a:rPr>
+                        <a:t>Requirements Gathering and complete design</a:t>
+                      </a:r>
+                      <a:endParaRPr lang="en-US" sz="800" b="0" i="0" u="none" strike="noStrike">
+                        <a:solidFill>
+                          <a:srgbClr val="000000"/>
+                        </a:solidFill>
+                        <a:effectLst/>
+                        <a:latin typeface="Calibri"/>
+                      </a:endParaRPr>
+                    </a:p>
+                  </a:txBody>
+                  <a:tcPr marL="9525" marR="9525" marT="7144" marB="0" anchor="b"/>
+                </a:tc>
+                <a:tc>
+                  <a:txBody>
+                    <a:bodyPr/>
+                    <a:lstStyle/>
+                    <a:p>
+                      <a:pPr algn="ctr" fontAlgn="b"/>
+                      <a:r>
+                        <a:rPr lang="en-US" sz="800" u="none" strike="noStrike">
+                          <a:effectLst/>
+                        </a:rPr>
+                        <a:t>15</a:t>
+                      </a:r>
+                      <a:endParaRPr lang="en-US" sz="800" b="0" i="0" u="none" strike="noStrike">
+                        <a:solidFill>
+                          <a:srgbClr val="000000"/>
+                        </a:solidFill>
+                        <a:effectLst/>
+                        <a:latin typeface="Calibri"/>
+                      </a:endParaRPr>
+                    </a:p>
+                  </a:txBody>
+                  <a:tcPr marL="9525" marR="9525" marT="7144" marB="0" anchor="b"/>
+                </a:tc>
+              </a:tr>
+              <a:tr h="442913">
+                <a:tc>
+                  <a:txBody>
+                    <a:bodyPr/>
+                    <a:lstStyle/>
+                    <a:p>
+                      <a:pPr algn="ctr" fontAlgn="b"/>
+                      <a:r>
+                        <a:rPr lang="en-US" sz="800" u="none" strike="noStrike">
+                          <a:effectLst/>
+                        </a:rPr>
+                        <a:t>Aman</a:t>
+                      </a:r>
+                      <a:endParaRPr lang="en-US" sz="800" b="0" i="0" u="none" strike="noStrike">
+                        <a:solidFill>
+                          <a:srgbClr val="000000"/>
+                        </a:solidFill>
+                        <a:effectLst/>
+                        <a:latin typeface="Calibri"/>
+                      </a:endParaRPr>
+                    </a:p>
+                  </a:txBody>
+                  <a:tcPr marL="9525" marR="9525" marT="7144" marB="0" anchor="b"/>
+                </a:tc>
+                <a:tc>
+                  <a:txBody>
+                    <a:bodyPr/>
+                    <a:lstStyle/>
+                    <a:p>
+                      <a:pPr algn="l" fontAlgn="b"/>
+                      <a:r>
+                        <a:rPr lang="en-US" sz="800" u="none" strike="noStrike" dirty="0">
+                          <a:effectLst/>
+                        </a:rPr>
+                        <a:t>Dashboard, Events creation, Home page, Pre recorded </a:t>
+                      </a:r>
+                      <a:r>
+                        <a:rPr lang="en-US" sz="800" u="none" strike="noStrike" dirty="0" smtClean="0">
+                          <a:effectLst/>
+                        </a:rPr>
+                        <a:t>– videos</a:t>
+                      </a:r>
+                    </a:p>
+                    <a:p>
+                      <a:pPr algn="l" fontAlgn="b"/>
+                      <a:r>
+                        <a:rPr lang="en-US" sz="800" b="0" i="0" u="none" strike="noStrike" dirty="0" smtClean="0">
+                          <a:solidFill>
+                            <a:srgbClr val="000000"/>
+                          </a:solidFill>
+                          <a:effectLst/>
+                          <a:latin typeface="Calibri"/>
+                        </a:rPr>
+                        <a:t>Files:</a:t>
+                      </a:r>
+                      <a:r>
+                        <a:rPr lang="en-US" sz="800" b="0" i="0" u="none" strike="noStrike" baseline="0" dirty="0" smtClean="0">
+                          <a:solidFill>
+                            <a:srgbClr val="000000"/>
+                          </a:solidFill>
+                          <a:effectLst/>
+                          <a:latin typeface="Calibri"/>
+                        </a:rPr>
+                        <a:t> </a:t>
+                      </a:r>
+                      <a:r>
+                        <a:rPr lang="en-US" sz="800" b="0" i="0" u="none" strike="noStrike" baseline="0" dirty="0" err="1" smtClean="0">
+                          <a:solidFill>
+                            <a:srgbClr val="000000"/>
+                          </a:solidFill>
+                          <a:effectLst/>
+                          <a:latin typeface="Calibri"/>
+                        </a:rPr>
+                        <a:t>broadcast.php</a:t>
+                      </a:r>
+                      <a:r>
+                        <a:rPr lang="en-US" sz="800" b="0" i="0" u="none" strike="noStrike" baseline="0" dirty="0" smtClean="0">
+                          <a:solidFill>
+                            <a:srgbClr val="000000"/>
+                          </a:solidFill>
+                          <a:effectLst/>
+                          <a:latin typeface="Calibri"/>
+                        </a:rPr>
+                        <a:t>, </a:t>
+                      </a:r>
+                      <a:r>
+                        <a:rPr lang="en-US" sz="800" b="0" i="0" u="none" strike="noStrike" baseline="0" dirty="0" err="1" smtClean="0">
+                          <a:solidFill>
+                            <a:srgbClr val="000000"/>
+                          </a:solidFill>
+                          <a:effectLst/>
+                          <a:latin typeface="Calibri"/>
+                        </a:rPr>
+                        <a:t>dashboard.php</a:t>
+                      </a:r>
+                      <a:r>
+                        <a:rPr lang="en-US" sz="800" b="0" i="0" u="none" strike="noStrike" baseline="0" dirty="0" smtClean="0">
+                          <a:solidFill>
+                            <a:srgbClr val="000000"/>
+                          </a:solidFill>
+                          <a:effectLst/>
+                          <a:latin typeface="Calibri"/>
+                        </a:rPr>
+                        <a:t>, </a:t>
+                      </a:r>
+                      <a:r>
+                        <a:rPr lang="en-US" sz="800" b="0" i="0" u="none" strike="noStrike" baseline="0" dirty="0" err="1" smtClean="0">
+                          <a:solidFill>
+                            <a:srgbClr val="000000"/>
+                          </a:solidFill>
+                          <a:effectLst/>
+                          <a:latin typeface="Calibri"/>
+                        </a:rPr>
+                        <a:t>logout.php</a:t>
+                      </a:r>
+                      <a:r>
+                        <a:rPr lang="en-US" sz="800" b="0" i="0" u="none" strike="noStrike" baseline="0" dirty="0" smtClean="0">
+                          <a:solidFill>
+                            <a:srgbClr val="000000"/>
+                          </a:solidFill>
+                          <a:effectLst/>
+                          <a:latin typeface="Calibri"/>
+                        </a:rPr>
+                        <a:t>, </a:t>
+                      </a:r>
+                      <a:r>
+                        <a:rPr lang="en-US" sz="800" b="0" i="0" u="none" strike="noStrike" baseline="0" dirty="0" err="1" smtClean="0">
+                          <a:solidFill>
+                            <a:srgbClr val="000000"/>
+                          </a:solidFill>
+                          <a:effectLst/>
+                          <a:latin typeface="Calibri"/>
+                        </a:rPr>
+                        <a:t>index.php</a:t>
+                      </a:r>
+                      <a:endParaRPr lang="en-US" sz="800" b="0" i="0" u="none" strike="noStrike" dirty="0">
+                        <a:solidFill>
+                          <a:srgbClr val="000000"/>
+                        </a:solidFill>
+                        <a:effectLst/>
+                        <a:latin typeface="Calibri"/>
+                      </a:endParaRPr>
+                    </a:p>
+                  </a:txBody>
+                  <a:tcPr marL="9525" marR="9525" marT="7144" marB="0" anchor="b"/>
+                </a:tc>
+                <a:tc>
+                  <a:txBody>
+                    <a:bodyPr/>
+                    <a:lstStyle/>
+                    <a:p>
+                      <a:pPr algn="ctr" fontAlgn="b"/>
+                      <a:r>
+                        <a:rPr lang="en-US" sz="800" u="none" strike="noStrike">
+                          <a:effectLst/>
+                        </a:rPr>
+                        <a:t>25</a:t>
+                      </a:r>
+                      <a:endParaRPr lang="en-US" sz="800" b="0" i="0" u="none" strike="noStrike">
+                        <a:solidFill>
+                          <a:srgbClr val="000000"/>
+                        </a:solidFill>
+                        <a:effectLst/>
+                        <a:latin typeface="Calibri"/>
+                      </a:endParaRPr>
+                    </a:p>
+                  </a:txBody>
+                  <a:tcPr marL="9525" marR="9525" marT="7144" marB="0" anchor="b"/>
+                </a:tc>
+              </a:tr>
+              <a:tr h="442913">
+                <a:tc>
+                  <a:txBody>
+                    <a:bodyPr/>
+                    <a:lstStyle/>
+                    <a:p>
+                      <a:pPr algn="ctr" fontAlgn="b"/>
+                      <a:r>
+                        <a:rPr lang="en-US" sz="800" u="none" strike="noStrike">
+                          <a:effectLst/>
+                        </a:rPr>
+                        <a:t>Krishnan</a:t>
+                      </a:r>
+                      <a:endParaRPr lang="en-US" sz="800" b="0" i="0" u="none" strike="noStrike">
+                        <a:solidFill>
+                          <a:srgbClr val="000000"/>
+                        </a:solidFill>
+                        <a:effectLst/>
+                        <a:latin typeface="Calibri"/>
+                      </a:endParaRPr>
+                    </a:p>
+                  </a:txBody>
+                  <a:tcPr marL="9525" marR="9525" marT="7144" marB="0" anchor="b"/>
+                </a:tc>
+                <a:tc>
+                  <a:txBody>
+                    <a:bodyPr/>
+                    <a:lstStyle/>
+                    <a:p>
+                      <a:pPr algn="l" fontAlgn="b"/>
+                      <a:r>
+                        <a:rPr lang="en-US" sz="800" u="none" strike="noStrike" dirty="0">
+                          <a:effectLst/>
+                        </a:rPr>
+                        <a:t>Login Page, Sign up page, Facebook Login, AWS Hosting</a:t>
+                      </a:r>
+                      <a:r>
+                        <a:rPr lang="en-US" sz="800" u="none" strike="noStrike" dirty="0" smtClean="0">
+                          <a:effectLst/>
+                        </a:rPr>
+                        <a:t>,</a:t>
+                      </a:r>
+                    </a:p>
+                    <a:p>
+                      <a:pPr algn="l" fontAlgn="b"/>
+                      <a:r>
+                        <a:rPr lang="en-US" sz="800" b="0" i="0" u="none" strike="noStrike" dirty="0" smtClean="0">
+                          <a:solidFill>
+                            <a:srgbClr val="000000"/>
+                          </a:solidFill>
+                          <a:effectLst/>
+                          <a:latin typeface="Calibri"/>
+                        </a:rPr>
+                        <a:t>Files: </a:t>
+                      </a:r>
+                      <a:r>
+                        <a:rPr lang="en-US" sz="800" b="0" i="0" u="none" strike="noStrike" dirty="0" err="1" smtClean="0">
+                          <a:solidFill>
+                            <a:srgbClr val="000000"/>
+                          </a:solidFill>
+                          <a:effectLst/>
+                          <a:latin typeface="Calibri"/>
+                        </a:rPr>
+                        <a:t>broadcast.php</a:t>
+                      </a:r>
+                      <a:r>
+                        <a:rPr lang="en-US" sz="800" b="0" i="0" u="none" strike="noStrike" dirty="0" smtClean="0">
+                          <a:solidFill>
+                            <a:srgbClr val="000000"/>
+                          </a:solidFill>
+                          <a:effectLst/>
+                          <a:latin typeface="Calibri"/>
+                        </a:rPr>
+                        <a:t>, </a:t>
+                      </a:r>
+                      <a:r>
+                        <a:rPr lang="en-US" sz="800" b="0" i="0" u="none" strike="noStrike" dirty="0" err="1" smtClean="0">
+                          <a:solidFill>
+                            <a:srgbClr val="000000"/>
+                          </a:solidFill>
+                          <a:effectLst/>
+                          <a:latin typeface="Calibri"/>
+                        </a:rPr>
+                        <a:t>dashboard.php</a:t>
+                      </a:r>
+                      <a:r>
+                        <a:rPr lang="en-US" sz="800" b="0" i="0" u="none" strike="noStrike" dirty="0" smtClean="0">
+                          <a:solidFill>
+                            <a:srgbClr val="000000"/>
+                          </a:solidFill>
+                          <a:effectLst/>
+                          <a:latin typeface="Calibri"/>
+                        </a:rPr>
+                        <a:t>, </a:t>
+                      </a:r>
+                      <a:r>
+                        <a:rPr lang="en-US" sz="800" b="0" i="0" u="none" strike="noStrike" dirty="0" err="1" smtClean="0">
+                          <a:solidFill>
+                            <a:srgbClr val="000000"/>
+                          </a:solidFill>
+                          <a:effectLst/>
+                          <a:latin typeface="Calibri"/>
+                        </a:rPr>
+                        <a:t>login.php</a:t>
+                      </a:r>
+                      <a:r>
+                        <a:rPr lang="en-US" sz="800" b="0" i="0" u="none" strike="noStrike" dirty="0" smtClean="0">
+                          <a:solidFill>
+                            <a:srgbClr val="000000"/>
+                          </a:solidFill>
+                          <a:effectLst/>
+                          <a:latin typeface="Calibri"/>
+                        </a:rPr>
+                        <a:t>, login.js, facebook.js, </a:t>
+                      </a:r>
+                      <a:r>
+                        <a:rPr lang="en-US" sz="800" b="0" i="0" u="none" strike="noStrike" smtClean="0">
+                          <a:solidFill>
+                            <a:srgbClr val="000000"/>
+                          </a:solidFill>
+                          <a:effectLst/>
+                          <a:latin typeface="Calibri"/>
+                        </a:rPr>
+                        <a:t>process.php</a:t>
+                      </a:r>
+                      <a:endParaRPr lang="en-US" sz="800" b="0" i="0" u="none" strike="noStrike" dirty="0">
+                        <a:solidFill>
+                          <a:srgbClr val="000000"/>
+                        </a:solidFill>
+                        <a:effectLst/>
+                        <a:latin typeface="Calibri"/>
+                      </a:endParaRPr>
+                    </a:p>
+                  </a:txBody>
+                  <a:tcPr marL="9525" marR="9525" marT="7144" marB="0" anchor="b"/>
+                </a:tc>
+                <a:tc>
+                  <a:txBody>
+                    <a:bodyPr/>
+                    <a:lstStyle/>
+                    <a:p>
+                      <a:pPr algn="ctr" fontAlgn="b"/>
+                      <a:r>
+                        <a:rPr lang="en-US" sz="800" u="none" strike="noStrike">
+                          <a:effectLst/>
+                        </a:rPr>
+                        <a:t>25</a:t>
+                      </a:r>
+                      <a:endParaRPr lang="en-US" sz="800" b="0" i="0" u="none" strike="noStrike">
+                        <a:solidFill>
+                          <a:srgbClr val="000000"/>
+                        </a:solidFill>
+                        <a:effectLst/>
+                        <a:latin typeface="Calibri"/>
+                      </a:endParaRPr>
+                    </a:p>
+                  </a:txBody>
+                  <a:tcPr marL="9525" marR="9525" marT="7144" marB="0" anchor="b"/>
+                </a:tc>
+              </a:tr>
+              <a:tr h="442913">
+                <a:tc>
+                  <a:txBody>
+                    <a:bodyPr/>
+                    <a:lstStyle/>
+                    <a:p>
+                      <a:pPr algn="ctr" fontAlgn="b"/>
+                      <a:r>
+                        <a:rPr lang="en-US" sz="800" u="none" strike="noStrike">
+                          <a:effectLst/>
+                        </a:rPr>
+                        <a:t> </a:t>
+                      </a:r>
+                      <a:endParaRPr lang="en-US" sz="800" b="0" i="0" u="none" strike="noStrike">
+                        <a:solidFill>
+                          <a:srgbClr val="000000"/>
+                        </a:solidFill>
+                        <a:effectLst/>
+                        <a:latin typeface="Calibri"/>
+                      </a:endParaRPr>
+                    </a:p>
+                  </a:txBody>
+                  <a:tcPr marL="9525" marR="9525" marT="7144" marB="0" anchor="b"/>
+                </a:tc>
+                <a:tc>
+                  <a:txBody>
+                    <a:bodyPr/>
+                    <a:lstStyle/>
+                    <a:p>
+                      <a:pPr algn="l" fontAlgn="b"/>
+                      <a:r>
+                        <a:rPr lang="en-US" sz="800" u="none" strike="noStrike" dirty="0">
+                          <a:effectLst/>
+                        </a:rPr>
+                        <a:t>Audio/Video combining using FFMPEG, Dashboard</a:t>
+                      </a:r>
+                      <a:endParaRPr lang="en-US" sz="800" b="0" i="0" u="none" strike="noStrike" dirty="0">
+                        <a:solidFill>
+                          <a:srgbClr val="000000"/>
+                        </a:solidFill>
+                        <a:effectLst/>
+                        <a:latin typeface="Calibri"/>
+                      </a:endParaRPr>
+                    </a:p>
+                  </a:txBody>
+                  <a:tcPr marL="9525" marR="9525" marT="7144" marB="0" anchor="b"/>
+                </a:tc>
+                <a:tc>
+                  <a:txBody>
+                    <a:bodyPr/>
+                    <a:lstStyle/>
+                    <a:p>
+                      <a:pPr algn="ctr" fontAlgn="b"/>
+                      <a:r>
+                        <a:rPr lang="en-US" sz="800" u="none" strike="noStrike">
+                          <a:effectLst/>
+                        </a:rPr>
+                        <a:t> </a:t>
+                      </a:r>
+                      <a:endParaRPr lang="en-US" sz="800" b="0" i="0" u="none" strike="noStrike">
+                        <a:solidFill>
+                          <a:srgbClr val="000000"/>
+                        </a:solidFill>
+                        <a:effectLst/>
+                        <a:latin typeface="Calibri"/>
+                      </a:endParaRPr>
+                    </a:p>
+                  </a:txBody>
+                  <a:tcPr marL="9525" marR="9525" marT="7144" marB="0" anchor="b"/>
+                </a:tc>
+              </a:tr>
+              <a:tr h="442913">
+                <a:tc>
+                  <a:txBody>
+                    <a:bodyPr/>
+                    <a:lstStyle/>
+                    <a:p>
+                      <a:pPr algn="ctr" fontAlgn="b"/>
+                      <a:r>
+                        <a:rPr lang="en-US" sz="800" u="none" strike="noStrike">
+                          <a:effectLst/>
+                        </a:rPr>
+                        <a:t>Shiva</a:t>
+                      </a:r>
+                      <a:endParaRPr lang="en-US" sz="800" b="0" i="0" u="none" strike="noStrike">
+                        <a:solidFill>
+                          <a:srgbClr val="000000"/>
+                        </a:solidFill>
+                        <a:effectLst/>
+                        <a:latin typeface="Calibri"/>
+                      </a:endParaRPr>
+                    </a:p>
+                  </a:txBody>
+                  <a:tcPr marL="9525" marR="9525" marT="7144" marB="0" anchor="b"/>
+                </a:tc>
+                <a:tc>
+                  <a:txBody>
+                    <a:bodyPr/>
+                    <a:lstStyle/>
+                    <a:p>
+                      <a:pPr algn="l" fontAlgn="b"/>
+                      <a:r>
+                        <a:rPr lang="en-US" sz="800" u="none" strike="noStrike" dirty="0">
+                          <a:effectLst/>
+                        </a:rPr>
+                        <a:t>Implemented Signaling server using socket.io, </a:t>
+                      </a:r>
+                      <a:r>
+                        <a:rPr lang="en-US" sz="800" u="none" strike="noStrike" dirty="0" smtClean="0">
+                          <a:effectLst/>
+                        </a:rPr>
+                        <a:t>Chat</a:t>
+                      </a:r>
+                    </a:p>
+                    <a:p>
+                      <a:pPr algn="l" fontAlgn="b"/>
+                      <a:r>
+                        <a:rPr lang="en-US" sz="800" b="0" i="0" u="none" strike="noStrike" dirty="0" smtClean="0">
+                          <a:solidFill>
+                            <a:srgbClr val="000000"/>
+                          </a:solidFill>
+                          <a:effectLst/>
+                          <a:latin typeface="Calibri"/>
+                        </a:rPr>
+                        <a:t>Files: </a:t>
+                      </a:r>
+                      <a:r>
+                        <a:rPr lang="en-US" sz="800" b="0" i="0" u="none" strike="noStrike" dirty="0" err="1" smtClean="0">
+                          <a:solidFill>
+                            <a:srgbClr val="000000"/>
+                          </a:solidFill>
+                          <a:effectLst/>
+                          <a:latin typeface="Calibri"/>
+                        </a:rPr>
+                        <a:t>broadcast.php</a:t>
+                      </a:r>
+                      <a:r>
+                        <a:rPr lang="en-US" sz="800" b="0" i="0" u="none" strike="noStrike" dirty="0" smtClean="0">
+                          <a:solidFill>
+                            <a:srgbClr val="000000"/>
+                          </a:solidFill>
+                          <a:effectLst/>
+                          <a:latin typeface="Calibri"/>
+                        </a:rPr>
+                        <a:t>, main.js (built</a:t>
+                      </a:r>
+                      <a:r>
+                        <a:rPr lang="en-US" sz="800" b="0" i="0" u="none" strike="noStrike" baseline="0" dirty="0" smtClean="0">
+                          <a:solidFill>
+                            <a:srgbClr val="000000"/>
+                          </a:solidFill>
+                          <a:effectLst/>
+                          <a:latin typeface="Calibri"/>
+                        </a:rPr>
+                        <a:t> on from </a:t>
+                      </a:r>
+                      <a:r>
+                        <a:rPr lang="en-US" sz="800" b="0" i="0" u="none" strike="noStrike" dirty="0" smtClean="0">
+                          <a:solidFill>
+                            <a:srgbClr val="000000"/>
+                          </a:solidFill>
+                          <a:effectLst/>
+                          <a:latin typeface="Calibri"/>
+                        </a:rPr>
+                        <a:t>html5 rocks), </a:t>
+                      </a:r>
+                      <a:r>
+                        <a:rPr lang="en-US" sz="800" b="0" i="0" u="none" strike="noStrike" dirty="0" err="1" smtClean="0">
+                          <a:solidFill>
+                            <a:srgbClr val="000000"/>
+                          </a:solidFill>
+                          <a:effectLst/>
+                          <a:latin typeface="Calibri"/>
+                        </a:rPr>
+                        <a:t>combineaudiovideo.php</a:t>
+                      </a:r>
+                      <a:r>
+                        <a:rPr lang="en-US" sz="800" b="0" i="0" u="none" strike="noStrike" dirty="0" smtClean="0">
+                          <a:solidFill>
+                            <a:srgbClr val="000000"/>
+                          </a:solidFill>
+                          <a:effectLst/>
+                          <a:latin typeface="Calibri"/>
+                        </a:rPr>
+                        <a:t>,</a:t>
+                      </a:r>
+                      <a:r>
+                        <a:rPr lang="en-US" sz="800" b="0" i="0" u="none" strike="noStrike" baseline="0" dirty="0" smtClean="0">
+                          <a:solidFill>
+                            <a:srgbClr val="000000"/>
+                          </a:solidFill>
+                          <a:effectLst/>
+                          <a:latin typeface="Calibri"/>
+                        </a:rPr>
+                        <a:t> facebook.js, </a:t>
+                      </a:r>
+                      <a:r>
+                        <a:rPr lang="en-US" sz="800" b="0" i="0" u="none" strike="noStrike" baseline="0" dirty="0" err="1" smtClean="0">
+                          <a:solidFill>
+                            <a:srgbClr val="000000"/>
+                          </a:solidFill>
+                          <a:effectLst/>
+                          <a:latin typeface="Calibri"/>
+                        </a:rPr>
+                        <a:t>process.php</a:t>
+                      </a:r>
+                      <a:r>
+                        <a:rPr lang="en-US" sz="800" b="0" i="0" u="none" strike="noStrike" baseline="0" dirty="0" smtClean="0">
+                          <a:solidFill>
+                            <a:srgbClr val="000000"/>
+                          </a:solidFill>
+                          <a:effectLst/>
+                          <a:latin typeface="Calibri"/>
+                        </a:rPr>
+                        <a:t>, </a:t>
+                      </a:r>
+                      <a:r>
+                        <a:rPr lang="en-US" sz="800" b="0" i="0" u="none" strike="noStrike" baseline="0" dirty="0" err="1" smtClean="0">
+                          <a:solidFill>
+                            <a:srgbClr val="000000"/>
+                          </a:solidFill>
+                          <a:effectLst/>
+                          <a:latin typeface="Calibri"/>
+                        </a:rPr>
+                        <a:t>dashboard.php</a:t>
+                      </a:r>
+                      <a:r>
+                        <a:rPr lang="en-US" sz="800" b="0" i="0" u="none" strike="noStrike" baseline="0" dirty="0" smtClean="0">
+                          <a:solidFill>
+                            <a:srgbClr val="000000"/>
+                          </a:solidFill>
+                          <a:effectLst/>
+                          <a:latin typeface="Calibri"/>
+                        </a:rPr>
+                        <a:t>, server.js </a:t>
+                      </a:r>
+                      <a:r>
+                        <a:rPr lang="en-US" sz="800" b="0" i="0" u="none" strike="noStrike" dirty="0" smtClean="0">
+                          <a:solidFill>
+                            <a:srgbClr val="000000"/>
+                          </a:solidFill>
+                          <a:effectLst/>
+                          <a:latin typeface="Calibri"/>
+                        </a:rPr>
+                        <a:t> </a:t>
+                      </a:r>
+                      <a:endParaRPr lang="en-US" sz="800" b="0" i="0" u="none" strike="noStrike" dirty="0">
+                        <a:solidFill>
+                          <a:srgbClr val="000000"/>
+                        </a:solidFill>
+                        <a:effectLst/>
+                        <a:latin typeface="Calibri"/>
+                      </a:endParaRPr>
+                    </a:p>
+                  </a:txBody>
+                  <a:tcPr marL="9525" marR="9525" marT="7144" marB="0" anchor="b"/>
+                </a:tc>
+                <a:tc>
+                  <a:txBody>
+                    <a:bodyPr/>
+                    <a:lstStyle/>
+                    <a:p>
+                      <a:pPr algn="ctr" fontAlgn="b"/>
+                      <a:r>
+                        <a:rPr lang="en-US" sz="800" u="none" strike="noStrike">
+                          <a:effectLst/>
+                        </a:rPr>
+                        <a:t>25</a:t>
+                      </a:r>
+                      <a:endParaRPr lang="en-US" sz="800" b="0" i="0" u="none" strike="noStrike">
+                        <a:solidFill>
+                          <a:srgbClr val="000000"/>
+                        </a:solidFill>
+                        <a:effectLst/>
+                        <a:latin typeface="Calibri"/>
+                      </a:endParaRPr>
+                    </a:p>
+                  </a:txBody>
+                  <a:tcPr marL="9525" marR="9525" marT="7144" marB="0" anchor="b"/>
+                </a:tc>
+              </a:tr>
+              <a:tr h="442913">
+                <a:tc>
+                  <a:txBody>
+                    <a:bodyPr/>
+                    <a:lstStyle/>
+                    <a:p>
+                      <a:pPr algn="ctr" fontAlgn="b"/>
+                      <a:r>
+                        <a:rPr lang="en-US" sz="800" u="none" strike="noStrike">
+                          <a:effectLst/>
+                        </a:rPr>
+                        <a:t> </a:t>
+                      </a:r>
+                      <a:endParaRPr lang="en-US" sz="800" b="0" i="0" u="none" strike="noStrike">
+                        <a:solidFill>
+                          <a:srgbClr val="000000"/>
+                        </a:solidFill>
+                        <a:effectLst/>
+                        <a:latin typeface="Calibri"/>
+                      </a:endParaRPr>
+                    </a:p>
+                  </a:txBody>
+                  <a:tcPr marL="9525" marR="9525" marT="7144" marB="0" anchor="b"/>
+                </a:tc>
+                <a:tc>
+                  <a:txBody>
+                    <a:bodyPr/>
+                    <a:lstStyle/>
+                    <a:p>
+                      <a:pPr algn="l" fontAlgn="b"/>
+                      <a:r>
+                        <a:rPr lang="en-US" sz="800" u="none" strike="noStrike" dirty="0">
+                          <a:effectLst/>
+                        </a:rPr>
+                        <a:t>Facebook login, Video Recording, Setting up node server.</a:t>
+                      </a:r>
+                      <a:endParaRPr lang="en-US" sz="800" b="0" i="0" u="none" strike="noStrike" dirty="0">
+                        <a:solidFill>
+                          <a:srgbClr val="000000"/>
+                        </a:solidFill>
+                        <a:effectLst/>
+                        <a:latin typeface="Calibri"/>
+                      </a:endParaRPr>
+                    </a:p>
+                  </a:txBody>
+                  <a:tcPr marL="9525" marR="9525" marT="7144" marB="0" anchor="b"/>
+                </a:tc>
+                <a:tc>
+                  <a:txBody>
+                    <a:bodyPr/>
+                    <a:lstStyle/>
+                    <a:p>
+                      <a:pPr algn="l" fontAlgn="b"/>
+                      <a:r>
+                        <a:rPr lang="en-US" sz="800" u="none" strike="noStrike">
+                          <a:effectLst/>
+                        </a:rPr>
+                        <a:t> </a:t>
+                      </a:r>
+                      <a:endParaRPr lang="en-US" sz="800" b="0" i="0" u="none" strike="noStrike">
+                        <a:solidFill>
+                          <a:srgbClr val="000000"/>
+                        </a:solidFill>
+                        <a:effectLst/>
+                        <a:latin typeface="Calibri"/>
+                      </a:endParaRPr>
+                    </a:p>
+                  </a:txBody>
+                  <a:tcPr marL="9525" marR="9525" marT="7144" marB="0" anchor="b"/>
+                </a:tc>
+              </a:tr>
+              <a:tr h="442913">
+                <a:tc>
+                  <a:txBody>
+                    <a:bodyPr/>
+                    <a:lstStyle/>
+                    <a:p>
+                      <a:pPr algn="ctr" fontAlgn="b"/>
+                      <a:r>
+                        <a:rPr lang="en-US" sz="800" u="none" strike="noStrike">
+                          <a:effectLst/>
+                        </a:rPr>
+                        <a:t>Aman, Krishnan, Shiva</a:t>
+                      </a:r>
+                      <a:endParaRPr lang="en-US" sz="800" b="0" i="0" u="none" strike="noStrike">
+                        <a:solidFill>
+                          <a:srgbClr val="000000"/>
+                        </a:solidFill>
+                        <a:effectLst/>
+                        <a:latin typeface="Calibri"/>
+                      </a:endParaRPr>
+                    </a:p>
+                  </a:txBody>
+                  <a:tcPr marL="9525" marR="9525" marT="7144" marB="0" anchor="b"/>
+                </a:tc>
+                <a:tc>
+                  <a:txBody>
+                    <a:bodyPr/>
+                    <a:lstStyle/>
+                    <a:p>
+                      <a:pPr algn="l" fontAlgn="b"/>
+                      <a:r>
+                        <a:rPr lang="en-US" sz="800" u="none" strike="noStrike">
+                          <a:effectLst/>
+                        </a:rPr>
+                        <a:t>Testing and Integration</a:t>
+                      </a:r>
+                      <a:endParaRPr lang="en-US" sz="800" b="0" i="0" u="none" strike="noStrike">
+                        <a:solidFill>
+                          <a:srgbClr val="000000"/>
+                        </a:solidFill>
+                        <a:effectLst/>
+                        <a:latin typeface="Calibri"/>
+                      </a:endParaRPr>
+                    </a:p>
+                  </a:txBody>
+                  <a:tcPr marL="9525" marR="9525" marT="7144" marB="0" anchor="b"/>
+                </a:tc>
+                <a:tc>
+                  <a:txBody>
+                    <a:bodyPr/>
+                    <a:lstStyle/>
+                    <a:p>
+                      <a:pPr algn="ctr" fontAlgn="b"/>
+                      <a:r>
+                        <a:rPr lang="en-US" sz="800" u="none" strike="noStrike" dirty="0">
+                          <a:effectLst/>
+                        </a:rPr>
+                        <a:t>15</a:t>
+                      </a:r>
+                      <a:endParaRPr lang="en-US" sz="800" b="0" i="0" u="none" strike="noStrike" dirty="0">
+                        <a:solidFill>
+                          <a:srgbClr val="000000"/>
+                        </a:solidFill>
+                        <a:effectLst/>
+                        <a:latin typeface="Calibri"/>
+                      </a:endParaRPr>
+                    </a:p>
+                  </a:txBody>
+                  <a:tcPr marL="9525" marR="9525" marT="7144" marB="0" anchor="b"/>
+                </a:tc>
+              </a:tr>
+            </a:tbl>
+          </a:graphicData>
+        </a:graphic>
+      </p:graphicFrame>
+    </p:spTree>
+    <p:extLst>
+      <p:ext uri="{BB962C8B-B14F-4D97-AF65-F5344CB8AC3E}">
+        <p14:creationId xmlns:p14="http://schemas.microsoft.com/office/powerpoint/2010/main" val="3489100066"/>
+      </p:ext>
+    </p:extLst>
+  </p:cSld>
+  <p:clrMapOvr>
+    <a:masterClrMapping/>
+  </p:clrMapOvr>
+  <p:timing>
+    <p:tnLst>
+      <p:par>
+        <p:cTn xmlns:p14="http://schemas.microsoft.com/office/powerpoint/2010/main" id="1" dur="indefinite" restart="never" nodeType="tmRoot"/>
+      </p:par>
+    </p:tnLst>
+  </p:timing>
+</p:sld>
+</file>
+
+<file path=ppt/slides/slide5.xml><?xml version="1.0" encoding="utf-8"?>
 <p:sld xmlns:a="http://schemas.openxmlformats.org/drawingml/2006/main" xmlns:r="http://schemas.openxmlformats.org/officeDocument/2006/relationships" xmlns:p="http://schemas.openxmlformats.org/presentationml/2006/main">
   <p:cSld>
     <p:spTree>
@@ -8934,20 +10259,20 @@
   <p:clrMapOvr>
     <a:masterClrMapping/>
   </p:clrMapOvr>
-  <p:transition spd="slow">
+  <p:transition xmlns:p14="http://schemas.microsoft.com/office/powerpoint/2010/main" spd="slow">
     <p:cut/>
   </p:transition>
   <p:timing>
     <p:tnLst>
       <p:par>
-        <p:cTn id="1" dur="indefinite" restart="never" nodeType="tmRoot"/>
+        <p:cTn xmlns:p14="http://schemas.microsoft.com/office/powerpoint/2010/main" id="1" dur="indefinite" restart="never" nodeType="tmRoot"/>
       </p:par>
     </p:tnLst>
   </p:timing>
 </p:sld>
 </file>
 
-<file path=ppt/slides/slide5.xml><?xml version="1.0" encoding="utf-8"?>
+<file path=ppt/slides/slide6.xml><?xml version="1.0" encoding="utf-8"?>
 <p:sld xmlns:a="http://schemas.openxmlformats.org/drawingml/2006/main" xmlns:r="http://schemas.openxmlformats.org/officeDocument/2006/relationships" xmlns:p="http://schemas.openxmlformats.org/presentationml/2006/main">
   <p:cSld>
     <p:spTree>
@@ -9218,20 +10543,20 @@
   <p:clrMapOvr>
     <a:masterClrMapping/>
   </p:clrMapOvr>
-  <p:transition spd="slow">
+  <p:transition xmlns:p14="http://schemas.microsoft.com/office/powerpoint/2010/main" spd="slow">
     <p:cut/>
   </p:transition>
   <p:timing>
     <p:tnLst>
       <p:par>
-        <p:cTn id="1" dur="indefinite" restart="never" nodeType="tmRoot"/>
+        <p:cTn xmlns:p14="http://schemas.microsoft.com/office/powerpoint/2010/main" id="1" dur="indefinite" restart="never" nodeType="tmRoot"/>
       </p:par>
     </p:tnLst>
   </p:timing>
 </p:sld>
 </file>
 
-<file path=ppt/slides/slide6.xml><?xml version="1.0" encoding="utf-8"?>
+<file path=ppt/slides/slide7.xml><?xml version="1.0" encoding="utf-8"?>
 <p:sld xmlns:a="http://schemas.openxmlformats.org/drawingml/2006/main" xmlns:r="http://schemas.openxmlformats.org/officeDocument/2006/relationships" xmlns:p="http://schemas.openxmlformats.org/presentationml/2006/main">
   <p:cSld>
     <p:spTree>
@@ -9513,20 +10838,20 @@
   <p:clrMapOvr>
     <a:masterClrMapping/>
   </p:clrMapOvr>
-  <p:transition spd="slow">
+  <p:transition xmlns:p14="http://schemas.microsoft.com/office/powerpoint/2010/main" spd="slow">
     <p:cut/>
   </p:transition>
   <p:timing>
     <p:tnLst>
       <p:par>
-        <p:cTn id="1" dur="indefinite" restart="never" nodeType="tmRoot"/>
+        <p:cTn xmlns:p14="http://schemas.microsoft.com/office/powerpoint/2010/main" id="1" dur="indefinite" restart="never" nodeType="tmRoot"/>
       </p:par>
     </p:tnLst>
   </p:timing>
 </p:sld>
 </file>
 
-<file path=ppt/slides/slide7.xml><?xml version="1.0" encoding="utf-8"?>
+<file path=ppt/slides/slide8.xml><?xml version="1.0" encoding="utf-8"?>
 <p:sld xmlns:a="http://schemas.openxmlformats.org/drawingml/2006/main" xmlns:r="http://schemas.openxmlformats.org/officeDocument/2006/relationships" xmlns:p="http://schemas.openxmlformats.org/presentationml/2006/main">
   <p:cSld>
     <p:spTree>
@@ -9580,14 +10905,14 @@
   <p:timing>
     <p:tnLst>
       <p:par>
-        <p:cTn id="1" dur="indefinite" restart="never" nodeType="tmRoot"/>
+        <p:cTn xmlns:p14="http://schemas.microsoft.com/office/powerpoint/2010/main" id="1" dur="indefinite" restart="never" nodeType="tmRoot"/>
       </p:par>
     </p:tnLst>
   </p:timing>
 </p:sld>
 </file>
 
-<file path=ppt/slides/slide8.xml><?xml version="1.0" encoding="utf-8"?>
+<file path=ppt/slides/slide9.xml><?xml version="1.0" encoding="utf-8"?>
 <p:sld xmlns:a="http://schemas.openxmlformats.org/drawingml/2006/main" xmlns:r="http://schemas.openxmlformats.org/officeDocument/2006/relationships" xmlns:p="http://schemas.openxmlformats.org/presentationml/2006/main">
   <p:cSld>
     <p:spTree>
@@ -9768,153 +11093,13 @@
   <p:clrMapOvr>
     <a:masterClrMapping/>
   </p:clrMapOvr>
-  <p:transition spd="slow">
+  <p:transition xmlns:p14="http://schemas.microsoft.com/office/powerpoint/2010/main" spd="slow">
     <p:cut/>
   </p:transition>
   <p:timing>
     <p:tnLst>
       <p:par>
-        <p:cTn id="1" dur="indefinite" restart="never" nodeType="tmRoot"/>
-      </p:par>
-    </p:tnLst>
-  </p:timing>
-</p:sld>
-</file>
-
-<file path=ppt/slides/slide9.xml><?xml version="1.0" encoding="utf-8"?>
-<p:sld xmlns:a="http://schemas.openxmlformats.org/drawingml/2006/main" xmlns:r="http://schemas.openxmlformats.org/officeDocument/2006/relationships" xmlns:p="http://schemas.openxmlformats.org/presentationml/2006/main">
-  <p:cSld>
-    <p:spTree>
-      <p:nvGrpSpPr>
-        <p:cNvPr id="1" name="Shape 71"/>
-        <p:cNvGrpSpPr/>
-        <p:nvPr/>
-      </p:nvGrpSpPr>
-      <p:grpSpPr>
-        <a:xfrm>
-          <a:off x="0" y="0"/>
-          <a:ext cx="0" cy="0"/>
-          <a:chOff x="0" y="0"/>
-          <a:chExt cx="0" cy="0"/>
-        </a:xfrm>
-      </p:grpSpPr>
-      <p:sp>
-        <p:nvSpPr>
-          <p:cNvPr id="72" name="Shape 72"/>
-          <p:cNvSpPr txBox="1">
-            <a:spLocks noGrp="1"/>
-          </p:cNvSpPr>
-          <p:nvPr>
-            <p:ph type="title"/>
-          </p:nvPr>
-        </p:nvSpPr>
-        <p:spPr>
-          <a:xfrm>
-            <a:off x="457200" y="0"/>
-            <a:ext cx="8229600" cy="1063200"/>
-          </a:xfrm>
-          <a:prstGeom prst="rect">
-            <a:avLst/>
-          </a:prstGeom>
-        </p:spPr>
-        <p:txBody>
-          <a:bodyPr lIns="91425" tIns="91425" rIns="91425" bIns="91425" anchor="b" anchorCtr="0">
-            <a:noAutofit/>
-          </a:bodyPr>
-          <a:lstStyle/>
-          <a:p>
-            <a:pPr algn="ctr">
-              <a:spcBef>
-                <a:spcPts val="0"/>
-              </a:spcBef>
-              <a:buNone/>
-            </a:pPr>
-            <a:r>
-              <a:rPr lang="en-US" sz="2800">
-                <a:solidFill>
-                  <a:schemeClr val="dk1"/>
-                </a:solidFill>
-              </a:rPr>
-              <a:t>Login with facebook</a:t>
-            </a:r>
-          </a:p>
-        </p:txBody>
-      </p:sp>
-      <p:sp>
-        <p:nvSpPr>
-          <p:cNvPr id="73" name="Shape 73"/>
-          <p:cNvSpPr txBox="1">
-            <a:spLocks noGrp="1"/>
-          </p:cNvSpPr>
-          <p:nvPr>
-            <p:ph type="body" idx="1"/>
-          </p:nvPr>
-        </p:nvSpPr>
-        <p:spPr>
-          <a:xfrm>
-            <a:off x="513225" y="1244825"/>
-            <a:ext cx="8229600" cy="3943499"/>
-          </a:xfrm>
-          <a:prstGeom prst="rect">
-            <a:avLst/>
-          </a:prstGeom>
-        </p:spPr>
-        <p:txBody>
-          <a:bodyPr lIns="91425" tIns="91425" rIns="91425" bIns="91425" anchor="t" anchorCtr="0">
-            <a:noAutofit/>
-          </a:bodyPr>
-          <a:lstStyle/>
-          <a:p>
-            <a:pPr algn="ctr">
-              <a:spcBef>
-                <a:spcPts val="0"/>
-              </a:spcBef>
-              <a:buNone/>
-            </a:pPr>
-            <a:endParaRPr sz="2800"/>
-          </a:p>
-        </p:txBody>
-      </p:sp>
-      <p:pic>
-        <p:nvPicPr>
-          <p:cNvPr id="74" name="Shape 74"/>
-          <p:cNvPicPr preferRelativeResize="0"/>
-          <p:nvPr/>
-        </p:nvPicPr>
-        <p:blipFill>
-          <a:blip r:embed="rId3">
-            <a:alphaModFix/>
-          </a:blip>
-          <a:stretch>
-            <a:fillRect/>
-          </a:stretch>
-        </p:blipFill>
-        <p:spPr>
-          <a:xfrm>
-            <a:off x="959250" y="1354450"/>
-            <a:ext cx="7254650" cy="3724275"/>
-          </a:xfrm>
-          <a:prstGeom prst="rect">
-            <a:avLst/>
-          </a:prstGeom>
-          <a:noFill/>
-          <a:ln>
-            <a:noFill/>
-          </a:ln>
-        </p:spPr>
-      </p:pic>
-    </p:spTree>
-  </p:cSld>
-  <p:clrMapOvr>
-    <a:masterClrMapping/>
-  </p:clrMapOvr>
-  <p:transition spd="slow">
-    <p:cut/>
-  </p:transition>
-  <p:timing>
-    <p:tnLst>
-      <p:par>
-        <p:cTn id="1" dur="indefinite" restart="never" nodeType="tmRoot"/>
+        <p:cTn xmlns:p14="http://schemas.microsoft.com/office/powerpoint/2010/main" id="1" dur="indefinite" restart="never" nodeType="tmRoot"/>
       </p:par>
     </p:tnLst>
   </p:timing>

</xml_diff>